<commit_message>
updated boolean logic and added answers and student
</commit_message>
<xml_diff>
--- a/ALevel/BooleanLogic/BooleanAlgebra.pptx
+++ b/ALevel/BooleanLogic/BooleanAlgebra.pptx
@@ -5,16 +5,18 @@
     <p:sldMasterId id="2147483648" r:id="rId1"/>
   </p:sldMasterIdLst>
   <p:notesMasterIdLst>
-    <p:notesMasterId r:id="rId9"/>
+    <p:notesMasterId r:id="rId11"/>
   </p:notesMasterIdLst>
   <p:sldIdLst>
     <p:sldId id="256" r:id="rId2"/>
-    <p:sldId id="266" r:id="rId3"/>
-    <p:sldId id="267" r:id="rId4"/>
-    <p:sldId id="268" r:id="rId5"/>
-    <p:sldId id="269" r:id="rId6"/>
-    <p:sldId id="270" r:id="rId7"/>
-    <p:sldId id="271" r:id="rId8"/>
+    <p:sldId id="272" r:id="rId3"/>
+    <p:sldId id="266" r:id="rId4"/>
+    <p:sldId id="267" r:id="rId5"/>
+    <p:sldId id="268" r:id="rId6"/>
+    <p:sldId id="269" r:id="rId7"/>
+    <p:sldId id="270" r:id="rId8"/>
+    <p:sldId id="271" r:id="rId9"/>
+    <p:sldId id="273" r:id="rId10"/>
   </p:sldIdLst>
   <p:sldSz cx="24384000" cy="13716000"/>
   <p:notesSz cx="6858000" cy="9144000"/>
@@ -695,6 +697,72 @@
     </p:spTree>
     <p:extLst>
       <p:ext uri="{BB962C8B-B14F-4D97-AF65-F5344CB8AC3E}">
+        <p14:creationId xmlns:p14="http://schemas.microsoft.com/office/powerpoint/2010/main" val="2349294874"/>
+      </p:ext>
+    </p:extLst>
+  </p:cSld>
+  <p:clrMapOvr>
+    <a:masterClrMapping/>
+  </p:clrMapOvr>
+</p:notes>
+</file>
+
+<file path=ppt/notesSlides/notesSlide4.xml><?xml version="1.0" encoding="utf-8"?>
+<p:notes xmlns:a="http://schemas.openxmlformats.org/drawingml/2006/main" xmlns:r="http://schemas.openxmlformats.org/officeDocument/2006/relationships" xmlns:p="http://schemas.openxmlformats.org/presentationml/2006/main">
+  <p:cSld>
+    <p:spTree>
+      <p:nvGrpSpPr>
+        <p:cNvPr id="1" name=""/>
+        <p:cNvGrpSpPr/>
+        <p:nvPr/>
+      </p:nvGrpSpPr>
+      <p:grpSpPr>
+        <a:xfrm>
+          <a:off x="0" y="0"/>
+          <a:ext cx="0" cy="0"/>
+          <a:chOff x="0" y="0"/>
+          <a:chExt cx="0" cy="0"/>
+        </a:xfrm>
+      </p:grpSpPr>
+      <p:sp>
+        <p:nvSpPr>
+          <p:cNvPr id="2" name="Slide Image Placeholder 1"/>
+          <p:cNvSpPr>
+            <a:spLocks noGrp="1" noRot="1" noChangeAspect="1"/>
+          </p:cNvSpPr>
+          <p:nvPr>
+            <p:ph type="sldImg"/>
+          </p:nvPr>
+        </p:nvSpPr>
+        <p:spPr>
+          <a:xfrm>
+            <a:off x="381000" y="685800"/>
+            <a:ext cx="6096000" cy="3429000"/>
+          </a:xfrm>
+        </p:spPr>
+      </p:sp>
+      <p:sp>
+        <p:nvSpPr>
+          <p:cNvPr id="3" name="Notes Placeholder 2"/>
+          <p:cNvSpPr>
+            <a:spLocks noGrp="1"/>
+          </p:cNvSpPr>
+          <p:nvPr>
+            <p:ph type="body" idx="1"/>
+          </p:nvPr>
+        </p:nvSpPr>
+        <p:spPr/>
+        <p:txBody>
+          <a:bodyPr/>
+          <a:lstStyle/>
+          <a:p>
+            <a:endParaRPr lang="en-US" dirty="0"/>
+          </a:p>
+        </p:txBody>
+      </p:sp>
+    </p:spTree>
+    <p:extLst>
+      <p:ext uri="{BB962C8B-B14F-4D97-AF65-F5344CB8AC3E}">
         <p14:creationId xmlns:p14="http://schemas.microsoft.com/office/powerpoint/2010/main" val="2722197289"/>
       </p:ext>
     </p:extLst>
@@ -705,7 +773,7 @@
 </p:notes>
 </file>
 
-<file path=ppt/notesSlides/notesSlide4.xml><?xml version="1.0" encoding="utf-8"?>
+<file path=ppt/notesSlides/notesSlide5.xml><?xml version="1.0" encoding="utf-8"?>
 <p:notes xmlns:a="http://schemas.openxmlformats.org/drawingml/2006/main" xmlns:r="http://schemas.openxmlformats.org/officeDocument/2006/relationships" xmlns:p="http://schemas.openxmlformats.org/presentationml/2006/main">
   <p:cSld>
     <p:spTree>
@@ -3187,7 +3255,7 @@
           </a:ln>
           <a:extLst>
             <a:ext uri="{C572A759-6A51-4108-AA02-DFA0A04FC94B}">
-              <ma14:wrappingTextBoxFlag xmlns:ma14="http://schemas.microsoft.com/office/mac/drawingml/2011/main" xmlns:a14="http://schemas.microsoft.com/office/drawing/2010/main" xmlns:m="http://schemas.openxmlformats.org/officeDocument/2006/math" xmlns="" val="1"/>
+              <ma14:wrappingTextBoxFlag xmlns="" xmlns:m="http://schemas.openxmlformats.org/officeDocument/2006/math" xmlns:a14="http://schemas.microsoft.com/office/drawing/2010/main" xmlns:ma14="http://schemas.microsoft.com/office/mac/drawingml/2011/main" val="1"/>
             </a:ext>
           </a:extLst>
         </p:spPr>
@@ -3242,7 +3310,7 @@
           </a:ln>
           <a:extLst>
             <a:ext uri="{C572A759-6A51-4108-AA02-DFA0A04FC94B}">
-              <ma14:wrappingTextBoxFlag xmlns:ma14="http://schemas.microsoft.com/office/mac/drawingml/2011/main" xmlns:a14="http://schemas.microsoft.com/office/drawing/2010/main" xmlns:m="http://schemas.openxmlformats.org/officeDocument/2006/math" xmlns="" val="1"/>
+              <ma14:wrappingTextBoxFlag xmlns="" xmlns:m="http://schemas.openxmlformats.org/officeDocument/2006/math" xmlns:a14="http://schemas.microsoft.com/office/drawing/2010/main" xmlns:ma14="http://schemas.microsoft.com/office/mac/drawingml/2011/main" val="1"/>
             </a:ext>
           </a:extLst>
         </p:spPr>
@@ -4180,6 +4248,302 @@
           <a:chExt cx="0" cy="0"/>
         </a:xfrm>
       </p:grpSpPr>
+      <p:pic>
+        <p:nvPicPr>
+          <p:cNvPr id="1026" name="Picture 2">
+            <a:extLst>
+              <a:ext uri="{FF2B5EF4-FFF2-40B4-BE49-F238E27FC236}">
+                <a16:creationId xmlns:a16="http://schemas.microsoft.com/office/drawing/2014/main" id="{42E0BCC2-0F22-8743-4D33-E032EAACBC88}"/>
+              </a:ext>
+            </a:extLst>
+          </p:cNvPr>
+          <p:cNvPicPr>
+            <a:picLocks noChangeAspect="1" noChangeArrowheads="1"/>
+          </p:cNvPicPr>
+          <p:nvPr/>
+        </p:nvPicPr>
+        <p:blipFill>
+          <a:blip r:embed="rId2">
+            <a:extLst>
+              <a:ext uri="{28A0092B-C50C-407E-A947-70E740481C1C}">
+                <a14:useLocalDpi xmlns:a14="http://schemas.microsoft.com/office/drawing/2010/main" val="0"/>
+              </a:ext>
+            </a:extLst>
+          </a:blip>
+          <a:srcRect/>
+          <a:stretch>
+            <a:fillRect/>
+          </a:stretch>
+        </p:blipFill>
+        <p:spPr bwMode="auto">
+          <a:xfrm>
+            <a:off x="988482" y="1064684"/>
+            <a:ext cx="8595785" cy="4408908"/>
+          </a:xfrm>
+          <a:prstGeom prst="rect">
+            <a:avLst/>
+          </a:prstGeom>
+          <a:noFill/>
+          <a:extLst>
+            <a:ext uri="{909E8E84-426E-40DD-AFC4-6F175D3DCCD1}">
+              <a14:hiddenFill xmlns:a14="http://schemas.microsoft.com/office/drawing/2010/main">
+                <a:solidFill>
+                  <a:srgbClr val="FFFFFF"/>
+                </a:solidFill>
+              </a14:hiddenFill>
+            </a:ext>
+          </a:extLst>
+        </p:spPr>
+      </p:pic>
+      <p:pic>
+        <p:nvPicPr>
+          <p:cNvPr id="1028" name="Picture 4">
+            <a:extLst>
+              <a:ext uri="{FF2B5EF4-FFF2-40B4-BE49-F238E27FC236}">
+                <a16:creationId xmlns:a16="http://schemas.microsoft.com/office/drawing/2014/main" id="{A25EC567-B950-CC76-5043-2AF05E7C647F}"/>
+              </a:ext>
+            </a:extLst>
+          </p:cNvPr>
+          <p:cNvPicPr>
+            <a:picLocks noChangeAspect="1" noChangeArrowheads="1"/>
+          </p:cNvPicPr>
+          <p:nvPr/>
+        </p:nvPicPr>
+        <p:blipFill>
+          <a:blip r:embed="rId3">
+            <a:extLst>
+              <a:ext uri="{28A0092B-C50C-407E-A947-70E740481C1C}">
+                <a14:useLocalDpi xmlns:a14="http://schemas.microsoft.com/office/drawing/2010/main" val="0"/>
+              </a:ext>
+            </a:extLst>
+          </a:blip>
+          <a:srcRect/>
+          <a:stretch>
+            <a:fillRect/>
+          </a:stretch>
+        </p:blipFill>
+        <p:spPr bwMode="auto">
+          <a:xfrm>
+            <a:off x="6284518" y="4931725"/>
+            <a:ext cx="3299749" cy="4408908"/>
+          </a:xfrm>
+          <a:prstGeom prst="rect">
+            <a:avLst/>
+          </a:prstGeom>
+          <a:noFill/>
+          <a:extLst>
+            <a:ext uri="{909E8E84-426E-40DD-AFC4-6F175D3DCCD1}">
+              <a14:hiddenFill xmlns:a14="http://schemas.microsoft.com/office/drawing/2010/main">
+                <a:solidFill>
+                  <a:srgbClr val="FFFFFF"/>
+                </a:solidFill>
+              </a14:hiddenFill>
+            </a:ext>
+          </a:extLst>
+        </p:spPr>
+      </p:pic>
+      <p:pic>
+        <p:nvPicPr>
+          <p:cNvPr id="1030" name="Picture 6" descr="equation.pdf">
+            <a:extLst>
+              <a:ext uri="{FF2B5EF4-FFF2-40B4-BE49-F238E27FC236}">
+                <a16:creationId xmlns:a16="http://schemas.microsoft.com/office/drawing/2014/main" id="{D1D1323D-45CF-8AEE-BED7-E849AB972BB6}"/>
+              </a:ext>
+            </a:extLst>
+          </p:cNvPr>
+          <p:cNvPicPr>
+            <a:picLocks noChangeAspect="1" noChangeArrowheads="1"/>
+          </p:cNvPicPr>
+          <p:nvPr/>
+        </p:nvPicPr>
+        <p:blipFill>
+          <a:blip r:embed="rId4">
+            <a:extLst>
+              <a:ext uri="{28A0092B-C50C-407E-A947-70E740481C1C}">
+                <a14:useLocalDpi xmlns:a14="http://schemas.microsoft.com/office/drawing/2010/main" val="0"/>
+              </a:ext>
+            </a:extLst>
+          </a:blip>
+          <a:srcRect/>
+          <a:stretch>
+            <a:fillRect/>
+          </a:stretch>
+        </p:blipFill>
+        <p:spPr bwMode="auto">
+          <a:xfrm>
+            <a:off x="1495558" y="10475166"/>
+            <a:ext cx="7613651" cy="962646"/>
+          </a:xfrm>
+          <a:prstGeom prst="rect">
+            <a:avLst/>
+          </a:prstGeom>
+          <a:noFill/>
+          <a:extLst>
+            <a:ext uri="{909E8E84-426E-40DD-AFC4-6F175D3DCCD1}">
+              <a14:hiddenFill xmlns:a14="http://schemas.microsoft.com/office/drawing/2010/main">
+                <a:solidFill>
+                  <a:srgbClr val="FFFFFF"/>
+                </a:solidFill>
+              </a14:hiddenFill>
+            </a:ext>
+          </a:extLst>
+        </p:spPr>
+      </p:pic>
+      <p:pic>
+        <p:nvPicPr>
+          <p:cNvPr id="1034" name="Picture 10">
+            <a:extLst>
+              <a:ext uri="{FF2B5EF4-FFF2-40B4-BE49-F238E27FC236}">
+                <a16:creationId xmlns:a16="http://schemas.microsoft.com/office/drawing/2014/main" id="{70844301-9341-844D-A4DF-02C5904F71B5}"/>
+              </a:ext>
+            </a:extLst>
+          </p:cNvPr>
+          <p:cNvPicPr>
+            <a:picLocks noChangeAspect="1" noChangeArrowheads="1"/>
+          </p:cNvPicPr>
+          <p:nvPr/>
+        </p:nvPicPr>
+        <p:blipFill>
+          <a:blip r:embed="rId5">
+            <a:extLst>
+              <a:ext uri="{28A0092B-C50C-407E-A947-70E740481C1C}">
+                <a14:useLocalDpi xmlns:a14="http://schemas.microsoft.com/office/drawing/2010/main" val="0"/>
+              </a:ext>
+            </a:extLst>
+          </a:blip>
+          <a:srcRect/>
+          <a:stretch>
+            <a:fillRect/>
+          </a:stretch>
+        </p:blipFill>
+        <p:spPr bwMode="auto">
+          <a:xfrm>
+            <a:off x="20132759" y="781148"/>
+            <a:ext cx="3519026" cy="6789233"/>
+          </a:xfrm>
+          <a:prstGeom prst="rect">
+            <a:avLst/>
+          </a:prstGeom>
+          <a:noFill/>
+          <a:extLst>
+            <a:ext uri="{909E8E84-426E-40DD-AFC4-6F175D3DCCD1}">
+              <a14:hiddenFill xmlns:a14="http://schemas.microsoft.com/office/drawing/2010/main">
+                <a:solidFill>
+                  <a:srgbClr val="FFFFFF"/>
+                </a:solidFill>
+              </a14:hiddenFill>
+            </a:ext>
+          </a:extLst>
+        </p:spPr>
+      </p:pic>
+      <p:pic>
+        <p:nvPicPr>
+          <p:cNvPr id="6" name="Picture 5">
+            <a:extLst>
+              <a:ext uri="{FF2B5EF4-FFF2-40B4-BE49-F238E27FC236}">
+                <a16:creationId xmlns:a16="http://schemas.microsoft.com/office/drawing/2014/main" id="{E6334E36-E9D1-CFFE-16B7-2D5459076C0B}"/>
+              </a:ext>
+            </a:extLst>
+          </p:cNvPr>
+          <p:cNvPicPr>
+            <a:picLocks noChangeAspect="1"/>
+          </p:cNvPicPr>
+          <p:nvPr/>
+        </p:nvPicPr>
+        <p:blipFill>
+          <a:blip r:embed="rId6"/>
+          <a:stretch>
+            <a:fillRect/>
+          </a:stretch>
+        </p:blipFill>
+        <p:spPr>
+          <a:xfrm>
+            <a:off x="11564659" y="781147"/>
+            <a:ext cx="8584087" cy="6789233"/>
+          </a:xfrm>
+          <a:prstGeom prst="rect">
+            <a:avLst/>
+          </a:prstGeom>
+        </p:spPr>
+      </p:pic>
+      <p:pic>
+        <p:nvPicPr>
+          <p:cNvPr id="1036" name="Picture 12" descr="equation.pdf">
+            <a:extLst>
+              <a:ext uri="{FF2B5EF4-FFF2-40B4-BE49-F238E27FC236}">
+                <a16:creationId xmlns:a16="http://schemas.microsoft.com/office/drawing/2014/main" id="{CBD7590F-C748-8423-9B4F-9D2664107CD2}"/>
+              </a:ext>
+            </a:extLst>
+          </p:cNvPr>
+          <p:cNvPicPr>
+            <a:picLocks noChangeAspect="1" noChangeArrowheads="1"/>
+          </p:cNvPicPr>
+          <p:nvPr/>
+        </p:nvPicPr>
+        <p:blipFill>
+          <a:blip r:embed="rId7">
+            <a:extLst>
+              <a:ext uri="{28A0092B-C50C-407E-A947-70E740481C1C}">
+                <a14:useLocalDpi xmlns:a14="http://schemas.microsoft.com/office/drawing/2010/main" val="0"/>
+              </a:ext>
+            </a:extLst>
+          </a:blip>
+          <a:srcRect/>
+          <a:stretch>
+            <a:fillRect/>
+          </a:stretch>
+        </p:blipFill>
+        <p:spPr bwMode="auto">
+          <a:xfrm>
+            <a:off x="11725599" y="10475166"/>
+            <a:ext cx="11495908" cy="810609"/>
+          </a:xfrm>
+          <a:prstGeom prst="rect">
+            <a:avLst/>
+          </a:prstGeom>
+          <a:noFill/>
+          <a:extLst>
+            <a:ext uri="{909E8E84-426E-40DD-AFC4-6F175D3DCCD1}">
+              <a14:hiddenFill xmlns:a14="http://schemas.microsoft.com/office/drawing/2010/main">
+                <a:solidFill>
+                  <a:srgbClr val="FFFFFF"/>
+                </a:solidFill>
+              </a14:hiddenFill>
+            </a:ext>
+          </a:extLst>
+        </p:spPr>
+      </p:pic>
+    </p:spTree>
+    <p:extLst>
+      <p:ext uri="{BB962C8B-B14F-4D97-AF65-F5344CB8AC3E}">
+        <p14:creationId xmlns:p14="http://schemas.microsoft.com/office/powerpoint/2010/main" val="2602496074"/>
+      </p:ext>
+    </p:extLst>
+  </p:cSld>
+  <p:clrMapOvr>
+    <a:masterClrMapping/>
+  </p:clrMapOvr>
+  <p:transition spd="med"/>
+</p:sld>
+</file>
+
+<file path=ppt/slides/slide3.xml><?xml version="1.0" encoding="utf-8"?>
+<p:sld xmlns:a="http://schemas.openxmlformats.org/drawingml/2006/main" xmlns:r="http://schemas.openxmlformats.org/officeDocument/2006/relationships" xmlns:p="http://schemas.openxmlformats.org/presentationml/2006/main">
+  <p:cSld>
+    <p:spTree>
+      <p:nvGrpSpPr>
+        <p:cNvPr id="1" name=""/>
+        <p:cNvGrpSpPr/>
+        <p:nvPr/>
+      </p:nvGrpSpPr>
+      <p:grpSpPr>
+        <a:xfrm>
+          <a:off x="0" y="0"/>
+          <a:ext cx="0" cy="0"/>
+          <a:chOff x="0" y="0"/>
+          <a:chExt cx="0" cy="0"/>
+        </a:xfrm>
+      </p:grpSpPr>
       <p:sp>
         <p:nvSpPr>
           <p:cNvPr id="217" name="Treat each variable as a register.…"/>
@@ -4269,7 +4633,7 @@
           </a:ln>
           <a:extLst>
             <a:ext uri="{C572A759-6A51-4108-AA02-DFA0A04FC94B}">
-              <ma14:wrappingTextBoxFlag xmlns:ma14="http://schemas.microsoft.com/office/mac/drawingml/2011/main" xmlns:a14="http://schemas.microsoft.com/office/drawing/2010/main" xmlns:m="http://schemas.openxmlformats.org/officeDocument/2006/math" xmlns="" val="1"/>
+              <ma14:wrappingTextBoxFlag xmlns="" xmlns:m="http://schemas.openxmlformats.org/officeDocument/2006/math" xmlns:a14="http://schemas.microsoft.com/office/drawing/2010/main" xmlns:ma14="http://schemas.microsoft.com/office/mac/drawingml/2011/main" val="1"/>
             </a:ext>
           </a:extLst>
         </p:spPr>
@@ -4331,8 +4695,8 @@
           </a:prstGeom>
         </p:spPr>
       </p:pic>
-      <mc:AlternateContent xmlns:mc="http://schemas.openxmlformats.org/markup-compatibility/2006">
-        <mc:Choice xmlns:a14="http://schemas.microsoft.com/office/drawing/2010/main" Requires="a14">
+      <mc:AlternateContent xmlns:mc="http://schemas.openxmlformats.org/markup-compatibility/2006" xmlns:a14="http://schemas.microsoft.com/office/drawing/2010/main">
+        <mc:Choice Requires="a14">
           <p:sp>
             <p:nvSpPr>
               <p:cNvPr id="3" name="Bubble sort">
@@ -4358,7 +4722,7 @@
               </a:ln>
               <a:extLst>
                 <a:ext uri="{C572A759-6A51-4108-AA02-DFA0A04FC94B}">
-                  <ma14:wrappingTextBoxFlag xmlns:ma14="http://schemas.microsoft.com/office/mac/drawingml/2011/main" xmlns:m="http://schemas.openxmlformats.org/officeDocument/2006/math" xmlns="" val="1"/>
+                  <ma14:wrappingTextBoxFlag xmlns="" xmlns:m="http://schemas.openxmlformats.org/officeDocument/2006/math" xmlns:ma14="http://schemas.microsoft.com/office/mac/drawingml/2011/main" val="1"/>
                 </a:ext>
               </a:extLst>
             </p:spPr>
@@ -4416,7 +4780,7 @@
             </p:txBody>
           </p:sp>
         </mc:Choice>
-        <mc:Fallback>
+        <mc:Fallback xmlns="">
           <p:sp>
             <p:nvSpPr>
               <p:cNvPr id="3" name="Bubble sort">
@@ -4469,8 +4833,8 @@
           </p:sp>
         </mc:Fallback>
       </mc:AlternateContent>
-      <mc:AlternateContent xmlns:mc="http://schemas.openxmlformats.org/markup-compatibility/2006">
-        <mc:Choice xmlns:a14="http://schemas.microsoft.com/office/drawing/2010/main" Requires="a14">
+      <mc:AlternateContent xmlns:mc="http://schemas.openxmlformats.org/markup-compatibility/2006" xmlns:a14="http://schemas.microsoft.com/office/drawing/2010/main">
+        <mc:Choice Requires="a14">
           <p:sp>
             <p:nvSpPr>
               <p:cNvPr id="4" name="Bubble sort">
@@ -4496,7 +4860,7 @@
               </a:ln>
               <a:extLst>
                 <a:ext uri="{C572A759-6A51-4108-AA02-DFA0A04FC94B}">
-                  <ma14:wrappingTextBoxFlag xmlns:ma14="http://schemas.microsoft.com/office/mac/drawingml/2011/main" xmlns:m="http://schemas.openxmlformats.org/officeDocument/2006/math" xmlns="" val="1"/>
+                  <ma14:wrappingTextBoxFlag xmlns="" xmlns:m="http://schemas.openxmlformats.org/officeDocument/2006/math" xmlns:ma14="http://schemas.microsoft.com/office/mac/drawingml/2011/main" val="1"/>
                 </a:ext>
               </a:extLst>
             </p:spPr>
@@ -4554,7 +4918,7 @@
             </p:txBody>
           </p:sp>
         </mc:Choice>
-        <mc:Fallback>
+        <mc:Fallback xmlns="">
           <p:sp>
             <p:nvSpPr>
               <p:cNvPr id="4" name="Bubble sort">
@@ -4607,8 +4971,8 @@
           </p:sp>
         </mc:Fallback>
       </mc:AlternateContent>
-      <mc:AlternateContent xmlns:mc="http://schemas.openxmlformats.org/markup-compatibility/2006">
-        <mc:Choice xmlns:a14="http://schemas.microsoft.com/office/drawing/2010/main" Requires="a14">
+      <mc:AlternateContent xmlns:mc="http://schemas.openxmlformats.org/markup-compatibility/2006" xmlns:a14="http://schemas.microsoft.com/office/drawing/2010/main">
+        <mc:Choice Requires="a14">
           <p:sp>
             <p:nvSpPr>
               <p:cNvPr id="5" name="Bubble sort">
@@ -4634,7 +4998,7 @@
               </a:ln>
               <a:extLst>
                 <a:ext uri="{C572A759-6A51-4108-AA02-DFA0A04FC94B}">
-                  <ma14:wrappingTextBoxFlag xmlns:ma14="http://schemas.microsoft.com/office/mac/drawingml/2011/main" xmlns:m="http://schemas.openxmlformats.org/officeDocument/2006/math" xmlns="" val="1"/>
+                  <ma14:wrappingTextBoxFlag xmlns="" xmlns:m="http://schemas.openxmlformats.org/officeDocument/2006/math" xmlns:ma14="http://schemas.microsoft.com/office/mac/drawingml/2011/main" val="1"/>
                 </a:ext>
               </a:extLst>
             </p:spPr>
@@ -4692,7 +5056,7 @@
             </p:txBody>
           </p:sp>
         </mc:Choice>
-        <mc:Fallback>
+        <mc:Fallback xmlns="">
           <p:sp>
             <p:nvSpPr>
               <p:cNvPr id="5" name="Bubble sort">
@@ -4768,9 +5132,6 @@
                     <p:cTn id="3" fill="hold">
                       <p:stCondLst>
                         <p:cond delay="indefinite"/>
-                        <p:cond evt="onBegin" delay="0">
-                          <p:tn val="2"/>
-                        </p:cond>
                       </p:stCondLst>
                       <p:childTnLst>
                         <p:par>
@@ -4780,7 +5141,7 @@
                             </p:stCondLst>
                             <p:childTnLst>
                               <p:par>
-                                <p:cTn id="5" presetID="1" presetClass="entr" presetSubtype="0" fill="hold" grpId="0" nodeType="withEffect">
+                                <p:cTn id="5" presetID="1" presetClass="entr" presetSubtype="0" fill="hold" grpId="1" nodeType="clickEffect">
                                   <p:stCondLst>
                                     <p:cond delay="0"/>
                                   </p:stCondLst>
@@ -4807,7 +5168,7 @@
                                 </p:cTn>
                               </p:par>
                               <p:par>
-                                <p:cTn id="7" presetID="1" presetClass="entr" presetSubtype="0" fill="hold" grpId="0" nodeType="withEffect">
+                                <p:cTn id="7" presetID="1" presetClass="entr" presetSubtype="0" fill="hold" nodeType="withEffect">
                                   <p:stCondLst>
                                     <p:cond delay="0"/>
                                   </p:stCondLst>
@@ -4815,6 +5176,51 @@
                                     <p:set>
                                       <p:cBhvr>
                                         <p:cTn id="8" dur="1" fill="hold">
+                                          <p:stCondLst>
+                                            <p:cond delay="0"/>
+                                          </p:stCondLst>
+                                        </p:cTn>
+                                        <p:tgtEl>
+                                          <p:spTgt spid="2"/>
+                                        </p:tgtEl>
+                                        <p:attrNameLst>
+                                          <p:attrName>style.visibility</p:attrName>
+                                        </p:attrNameLst>
+                                      </p:cBhvr>
+                                      <p:to>
+                                        <p:strVal val="visible"/>
+                                      </p:to>
+                                    </p:set>
+                                  </p:childTnLst>
+                                </p:cTn>
+                              </p:par>
+                            </p:childTnLst>
+                          </p:cTn>
+                        </p:par>
+                      </p:childTnLst>
+                    </p:cTn>
+                  </p:par>
+                  <p:par>
+                    <p:cTn id="9" fill="hold">
+                      <p:stCondLst>
+                        <p:cond delay="indefinite"/>
+                      </p:stCondLst>
+                      <p:childTnLst>
+                        <p:par>
+                          <p:cTn id="10" fill="hold">
+                            <p:stCondLst>
+                              <p:cond delay="0"/>
+                            </p:stCondLst>
+                            <p:childTnLst>
+                              <p:par>
+                                <p:cTn id="11" presetID="1" presetClass="entr" presetSubtype="0" fill="hold" grpId="0" nodeType="clickEffect">
+                                  <p:stCondLst>
+                                    <p:cond delay="0"/>
+                                  </p:stCondLst>
+                                  <p:childTnLst>
+                                    <p:set>
+                                      <p:cBhvr>
+                                        <p:cTn id="12" dur="1" fill="hold">
                                           <p:stCondLst>
                                             <p:cond delay="0"/>
                                           </p:stCondLst>
@@ -4833,15 +5239,33 @@
                                   </p:childTnLst>
                                 </p:cTn>
                               </p:par>
+                            </p:childTnLst>
+                          </p:cTn>
+                        </p:par>
+                      </p:childTnLst>
+                    </p:cTn>
+                  </p:par>
+                  <p:par>
+                    <p:cTn id="13" fill="hold">
+                      <p:stCondLst>
+                        <p:cond delay="indefinite"/>
+                      </p:stCondLst>
+                      <p:childTnLst>
+                        <p:par>
+                          <p:cTn id="14" fill="hold">
+                            <p:stCondLst>
+                              <p:cond delay="0"/>
+                            </p:stCondLst>
+                            <p:childTnLst>
                               <p:par>
-                                <p:cTn id="9" presetID="1" presetClass="entr" presetSubtype="0" fill="hold" grpId="0" nodeType="withEffect">
+                                <p:cTn id="15" presetID="1" presetClass="entr" presetSubtype="0" fill="hold" grpId="0" nodeType="clickEffect">
                                   <p:stCondLst>
                                     <p:cond delay="0"/>
                                   </p:stCondLst>
                                   <p:childTnLst>
                                     <p:set>
                                       <p:cBhvr>
-                                        <p:cTn id="10" dur="1" fill="hold">
+                                        <p:cTn id="16" dur="1" fill="hold">
                                           <p:stCondLst>
                                             <p:cond delay="0"/>
                                           </p:stCondLst>
@@ -4860,15 +5284,33 @@
                                   </p:childTnLst>
                                 </p:cTn>
                               </p:par>
+                            </p:childTnLst>
+                          </p:cTn>
+                        </p:par>
+                      </p:childTnLst>
+                    </p:cTn>
+                  </p:par>
+                  <p:par>
+                    <p:cTn id="17" fill="hold">
+                      <p:stCondLst>
+                        <p:cond delay="indefinite"/>
+                      </p:stCondLst>
+                      <p:childTnLst>
+                        <p:par>
+                          <p:cTn id="18" fill="hold">
+                            <p:stCondLst>
+                              <p:cond delay="0"/>
+                            </p:stCondLst>
+                            <p:childTnLst>
                               <p:par>
-                                <p:cTn id="11" presetID="1" presetClass="entr" presetSubtype="0" fill="hold" grpId="0" nodeType="withEffect">
+                                <p:cTn id="19" presetID="1" presetClass="entr" presetSubtype="0" fill="hold" grpId="0" nodeType="clickEffect">
                                   <p:stCondLst>
                                     <p:cond delay="0"/>
                                   </p:stCondLst>
                                   <p:childTnLst>
                                     <p:set>
                                       <p:cBhvr>
-                                        <p:cTn id="12" dur="1" fill="hold">
+                                        <p:cTn id="20" dur="1" fill="hold">
                                           <p:stCondLst>
                                             <p:cond delay="0"/>
                                           </p:stCondLst>
@@ -4915,7 +5357,7 @@
       </p:par>
     </p:tnLst>
     <p:bldLst>
-      <p:bldP spid="220" grpId="0" animBg="1"/>
+      <p:bldP spid="220" grpId="1" animBg="1"/>
       <p:bldP spid="3" grpId="0" animBg="1"/>
       <p:bldP spid="4" grpId="0" animBg="1"/>
       <p:bldP spid="5" grpId="0" animBg="1"/>
@@ -4924,7 +5366,7 @@
 </p:sld>
 </file>
 
-<file path=ppt/slides/slide3.xml><?xml version="1.0" encoding="utf-8"?>
+<file path=ppt/slides/slide4.xml><?xml version="1.0" encoding="utf-8"?>
 <p:sld xmlns:a="http://schemas.openxmlformats.org/drawingml/2006/main" xmlns:r="http://schemas.openxmlformats.org/officeDocument/2006/relationships" xmlns:p="http://schemas.openxmlformats.org/presentationml/2006/main">
   <p:cSld>
     <p:spTree>
@@ -4984,7 +5426,7 @@
           <p:nvPr/>
         </p:nvPicPr>
         <p:blipFill>
-          <a:blip r:embed="rId2"/>
+          <a:blip r:embed="rId3"/>
           <a:stretch>
             <a:fillRect/>
           </a:stretch>
@@ -5014,7 +5456,7 @@
           <p:nvPr/>
         </p:nvPicPr>
         <p:blipFill>
-          <a:blip r:embed="rId3"/>
+          <a:blip r:embed="rId4"/>
           <a:stretch>
             <a:fillRect/>
           </a:stretch>
@@ -5044,7 +5486,7 @@
           <p:nvPr/>
         </p:nvPicPr>
         <p:blipFill>
-          <a:blip r:embed="rId4"/>
+          <a:blip r:embed="rId5"/>
           <a:stretch>
             <a:fillRect/>
           </a:stretch>
@@ -5059,8 +5501,8 @@
           </a:prstGeom>
         </p:spPr>
       </p:pic>
-      <mc:AlternateContent xmlns:mc="http://schemas.openxmlformats.org/markup-compatibility/2006">
-        <mc:Choice xmlns:a14="http://schemas.microsoft.com/office/drawing/2010/main" Requires="a14">
+      <mc:AlternateContent xmlns:mc="http://schemas.openxmlformats.org/markup-compatibility/2006" xmlns:a14="http://schemas.microsoft.com/office/drawing/2010/main">
+        <mc:Choice Requires="a14">
           <p:sp>
             <p:nvSpPr>
               <p:cNvPr id="8" name="Bubble sort">
@@ -5086,7 +5528,7 @@
               </a:ln>
               <a:extLst>
                 <a:ext uri="{C572A759-6A51-4108-AA02-DFA0A04FC94B}">
-                  <ma14:wrappingTextBoxFlag xmlns:ma14="http://schemas.microsoft.com/office/mac/drawingml/2011/main" xmlns:m="http://schemas.openxmlformats.org/officeDocument/2006/math" xmlns="" val="1"/>
+                  <ma14:wrappingTextBoxFlag xmlns="" xmlns:m="http://schemas.openxmlformats.org/officeDocument/2006/math" xmlns:ma14="http://schemas.microsoft.com/office/mac/drawingml/2011/main" val="1"/>
                 </a:ext>
               </a:extLst>
             </p:spPr>
@@ -5150,7 +5592,7 @@
             </p:txBody>
           </p:sp>
         </mc:Choice>
-        <mc:Fallback>
+        <mc:Fallback xmlns="">
           <p:sp>
             <p:nvSpPr>
               <p:cNvPr id="8" name="Bubble sort">
@@ -5174,7 +5616,7 @@
                 <a:avLst/>
               </a:prstGeom>
               <a:blipFill>
-                <a:blip r:embed="rId5"/>
+                <a:blip r:embed="rId6"/>
                 <a:stretch>
                   <a:fillRect l="-9441"/>
                 </a:stretch>
@@ -5203,8 +5645,8 @@
           </p:sp>
         </mc:Fallback>
       </mc:AlternateContent>
-      <mc:AlternateContent xmlns:mc="http://schemas.openxmlformats.org/markup-compatibility/2006">
-        <mc:Choice xmlns:a14="http://schemas.microsoft.com/office/drawing/2010/main" Requires="a14">
+      <mc:AlternateContent xmlns:mc="http://schemas.openxmlformats.org/markup-compatibility/2006" xmlns:a14="http://schemas.microsoft.com/office/drawing/2010/main">
+        <mc:Choice Requires="a14">
           <p:sp>
             <p:nvSpPr>
               <p:cNvPr id="9" name="Bubble sort">
@@ -5230,7 +5672,7 @@
               </a:ln>
               <a:extLst>
                 <a:ext uri="{C572A759-6A51-4108-AA02-DFA0A04FC94B}">
-                  <ma14:wrappingTextBoxFlag xmlns:ma14="http://schemas.microsoft.com/office/mac/drawingml/2011/main" xmlns:m="http://schemas.openxmlformats.org/officeDocument/2006/math" xmlns="" val="1"/>
+                  <ma14:wrappingTextBoxFlag xmlns="" xmlns:m="http://schemas.openxmlformats.org/officeDocument/2006/math" xmlns:ma14="http://schemas.microsoft.com/office/mac/drawingml/2011/main" val="1"/>
                 </a:ext>
               </a:extLst>
             </p:spPr>
@@ -5294,7 +5736,7 @@
             </p:txBody>
           </p:sp>
         </mc:Choice>
-        <mc:Fallback>
+        <mc:Fallback xmlns="">
           <p:sp>
             <p:nvSpPr>
               <p:cNvPr id="9" name="Bubble sort">
@@ -5318,7 +5760,7 @@
                 <a:avLst/>
               </a:prstGeom>
               <a:blipFill>
-                <a:blip r:embed="rId6"/>
+                <a:blip r:embed="rId7"/>
                 <a:stretch>
                   <a:fillRect l="-9441"/>
                 </a:stretch>
@@ -5347,8 +5789,8 @@
           </p:sp>
         </mc:Fallback>
       </mc:AlternateContent>
-      <mc:AlternateContent xmlns:mc="http://schemas.openxmlformats.org/markup-compatibility/2006">
-        <mc:Choice xmlns:a14="http://schemas.microsoft.com/office/drawing/2010/main" Requires="a14">
+      <mc:AlternateContent xmlns:mc="http://schemas.openxmlformats.org/markup-compatibility/2006" xmlns:a14="http://schemas.microsoft.com/office/drawing/2010/main">
+        <mc:Choice Requires="a14">
           <p:sp>
             <p:nvSpPr>
               <p:cNvPr id="10" name="Bubble sort">
@@ -5374,7 +5816,7 @@
               </a:ln>
               <a:extLst>
                 <a:ext uri="{C572A759-6A51-4108-AA02-DFA0A04FC94B}">
-                  <ma14:wrappingTextBoxFlag xmlns:ma14="http://schemas.microsoft.com/office/mac/drawingml/2011/main" xmlns:m="http://schemas.openxmlformats.org/officeDocument/2006/math" xmlns="" val="1"/>
+                  <ma14:wrappingTextBoxFlag xmlns="" xmlns:m="http://schemas.openxmlformats.org/officeDocument/2006/math" xmlns:ma14="http://schemas.microsoft.com/office/mac/drawingml/2011/main" val="1"/>
                 </a:ext>
               </a:extLst>
             </p:spPr>
@@ -5438,7 +5880,7 @@
             </p:txBody>
           </p:sp>
         </mc:Choice>
-        <mc:Fallback>
+        <mc:Fallback xmlns="">
           <p:sp>
             <p:nvSpPr>
               <p:cNvPr id="10" name="Bubble sort">
@@ -5462,7 +5904,7 @@
                 <a:avLst/>
               </a:prstGeom>
               <a:blipFill>
-                <a:blip r:embed="rId7"/>
+                <a:blip r:embed="rId8"/>
                 <a:stretch>
                   <a:fillRect l="-10490"/>
                 </a:stretch>
@@ -5491,8 +5933,8 @@
           </p:sp>
         </mc:Fallback>
       </mc:AlternateContent>
-      <mc:AlternateContent xmlns:mc="http://schemas.openxmlformats.org/markup-compatibility/2006">
-        <mc:Choice xmlns:a14="http://schemas.microsoft.com/office/drawing/2010/main" Requires="a14">
+      <mc:AlternateContent xmlns:mc="http://schemas.openxmlformats.org/markup-compatibility/2006" xmlns:a14="http://schemas.microsoft.com/office/drawing/2010/main">
+        <mc:Choice Requires="a14">
           <p:sp>
             <p:nvSpPr>
               <p:cNvPr id="11" name="Bubble sort">
@@ -5518,7 +5960,7 @@
               </a:ln>
               <a:extLst>
                 <a:ext uri="{C572A759-6A51-4108-AA02-DFA0A04FC94B}">
-                  <ma14:wrappingTextBoxFlag xmlns:ma14="http://schemas.microsoft.com/office/mac/drawingml/2011/main" xmlns:m="http://schemas.openxmlformats.org/officeDocument/2006/math" xmlns="" val="1"/>
+                  <ma14:wrappingTextBoxFlag xmlns="" xmlns:m="http://schemas.openxmlformats.org/officeDocument/2006/math" xmlns:ma14="http://schemas.microsoft.com/office/mac/drawingml/2011/main" val="1"/>
                 </a:ext>
               </a:extLst>
             </p:spPr>
@@ -5564,7 +6006,7 @@
             </p:txBody>
           </p:sp>
         </mc:Choice>
-        <mc:Fallback>
+        <mc:Fallback xmlns="">
           <p:sp>
             <p:nvSpPr>
               <p:cNvPr id="11" name="Bubble sort">
@@ -5588,7 +6030,7 @@
                 <a:avLst/>
               </a:prstGeom>
               <a:blipFill>
-                <a:blip r:embed="rId8"/>
+                <a:blip r:embed="rId9"/>
                 <a:stretch>
                   <a:fillRect l="-13699" t="-6767" b="-5263"/>
                 </a:stretch>
@@ -5617,8 +6059,8 @@
           </p:sp>
         </mc:Fallback>
       </mc:AlternateContent>
-      <mc:AlternateContent xmlns:mc="http://schemas.openxmlformats.org/markup-compatibility/2006">
-        <mc:Choice xmlns:a14="http://schemas.microsoft.com/office/drawing/2010/main" Requires="a14">
+      <mc:AlternateContent xmlns:mc="http://schemas.openxmlformats.org/markup-compatibility/2006" xmlns:a14="http://schemas.microsoft.com/office/drawing/2010/main">
+        <mc:Choice Requires="a14">
           <p:sp>
             <p:nvSpPr>
               <p:cNvPr id="12" name="Bubble sort">
@@ -5644,7 +6086,7 @@
               </a:ln>
               <a:extLst>
                 <a:ext uri="{C572A759-6A51-4108-AA02-DFA0A04FC94B}">
-                  <ma14:wrappingTextBoxFlag xmlns:ma14="http://schemas.microsoft.com/office/mac/drawingml/2011/main" xmlns:m="http://schemas.openxmlformats.org/officeDocument/2006/math" xmlns="" val="1"/>
+                  <ma14:wrappingTextBoxFlag xmlns="" xmlns:m="http://schemas.openxmlformats.org/officeDocument/2006/math" xmlns:ma14="http://schemas.microsoft.com/office/mac/drawingml/2011/main" val="1"/>
                 </a:ext>
               </a:extLst>
             </p:spPr>
@@ -5690,7 +6132,7 @@
             </p:txBody>
           </p:sp>
         </mc:Choice>
-        <mc:Fallback>
+        <mc:Fallback xmlns="">
           <p:sp>
             <p:nvSpPr>
               <p:cNvPr id="12" name="Bubble sort">
@@ -5714,7 +6156,7 @@
                 <a:avLst/>
               </a:prstGeom>
               <a:blipFill>
-                <a:blip r:embed="rId9"/>
+                <a:blip r:embed="rId10"/>
                 <a:stretch>
                   <a:fillRect l="-16438" t="-6015" b="-3759"/>
                 </a:stretch>
@@ -5743,8 +6185,8 @@
           </p:sp>
         </mc:Fallback>
       </mc:AlternateContent>
-      <mc:AlternateContent xmlns:mc="http://schemas.openxmlformats.org/markup-compatibility/2006">
-        <mc:Choice xmlns:a14="http://schemas.microsoft.com/office/drawing/2010/main" Requires="a14">
+      <mc:AlternateContent xmlns:mc="http://schemas.openxmlformats.org/markup-compatibility/2006" xmlns:a14="http://schemas.microsoft.com/office/drawing/2010/main">
+        <mc:Choice Requires="a14">
           <p:sp>
             <p:nvSpPr>
               <p:cNvPr id="13" name="Bubble sort">
@@ -5770,7 +6212,7 @@
               </a:ln>
               <a:extLst>
                 <a:ext uri="{C572A759-6A51-4108-AA02-DFA0A04FC94B}">
-                  <ma14:wrappingTextBoxFlag xmlns:ma14="http://schemas.microsoft.com/office/mac/drawingml/2011/main" xmlns:m="http://schemas.openxmlformats.org/officeDocument/2006/math" xmlns="" val="1"/>
+                  <ma14:wrappingTextBoxFlag xmlns="" xmlns:m="http://schemas.openxmlformats.org/officeDocument/2006/math" xmlns:ma14="http://schemas.microsoft.com/office/mac/drawingml/2011/main" val="1"/>
                 </a:ext>
               </a:extLst>
             </p:spPr>
@@ -5816,7 +6258,7 @@
             </p:txBody>
           </p:sp>
         </mc:Choice>
-        <mc:Fallback>
+        <mc:Fallback xmlns="">
           <p:sp>
             <p:nvSpPr>
               <p:cNvPr id="13" name="Bubble sort">
@@ -5840,7 +6282,7 @@
                 <a:avLst/>
               </a:prstGeom>
               <a:blipFill>
-                <a:blip r:embed="rId10"/>
+                <a:blip r:embed="rId11"/>
                 <a:stretch>
                   <a:fillRect l="-16327" t="-6015" b="-4511"/>
                 </a:stretch>
@@ -5884,7 +6326,7 @@
           <p:nvPr/>
         </p:nvPicPr>
         <p:blipFill>
-          <a:blip r:embed="rId11"/>
+          <a:blip r:embed="rId12"/>
           <a:stretch>
             <a:fillRect/>
           </a:stretch>
@@ -5914,7 +6356,7 @@
           <p:nvPr/>
         </p:nvPicPr>
         <p:blipFill>
-          <a:blip r:embed="rId12"/>
+          <a:blip r:embed="rId13"/>
           <a:stretch>
             <a:fillRect/>
           </a:stretch>
@@ -5944,7 +6386,7 @@
           <p:nvPr/>
         </p:nvPicPr>
         <p:blipFill>
-          <a:blip r:embed="rId13"/>
+          <a:blip r:embed="rId14"/>
           <a:stretch>
             <a:fillRect/>
           </a:stretch>
@@ -5959,8 +6401,8 @@
           </a:prstGeom>
         </p:spPr>
       </p:pic>
-      <mc:AlternateContent xmlns:mc="http://schemas.openxmlformats.org/markup-compatibility/2006">
-        <mc:Choice xmlns:a14="http://schemas.microsoft.com/office/drawing/2010/main" Requires="a14">
+      <mc:AlternateContent xmlns:mc="http://schemas.openxmlformats.org/markup-compatibility/2006" xmlns:a14="http://schemas.microsoft.com/office/drawing/2010/main">
+        <mc:Choice Requires="a14">
           <p:sp>
             <p:nvSpPr>
               <p:cNvPr id="17" name="Bubble sort">
@@ -5986,7 +6428,7 @@
               </a:ln>
               <a:extLst>
                 <a:ext uri="{C572A759-6A51-4108-AA02-DFA0A04FC94B}">
-                  <ma14:wrappingTextBoxFlag xmlns:ma14="http://schemas.microsoft.com/office/mac/drawingml/2011/main" xmlns:m="http://schemas.openxmlformats.org/officeDocument/2006/math" xmlns="" val="1"/>
+                  <ma14:wrappingTextBoxFlag xmlns="" xmlns:m="http://schemas.openxmlformats.org/officeDocument/2006/math" xmlns:ma14="http://schemas.microsoft.com/office/mac/drawingml/2011/main" val="1"/>
                 </a:ext>
               </a:extLst>
             </p:spPr>
@@ -6050,7 +6492,7 @@
             </p:txBody>
           </p:sp>
         </mc:Choice>
-        <mc:Fallback>
+        <mc:Fallback xmlns="">
           <p:sp>
             <p:nvSpPr>
               <p:cNvPr id="17" name="Bubble sort">
@@ -6074,7 +6516,7 @@
                 <a:avLst/>
               </a:prstGeom>
               <a:blipFill>
-                <a:blip r:embed="rId14"/>
+                <a:blip r:embed="rId15"/>
                 <a:stretch>
                   <a:fillRect l="-3599"/>
                 </a:stretch>
@@ -6103,8 +6545,8 @@
           </p:sp>
         </mc:Fallback>
       </mc:AlternateContent>
-      <mc:AlternateContent xmlns:mc="http://schemas.openxmlformats.org/markup-compatibility/2006">
-        <mc:Choice xmlns:a14="http://schemas.microsoft.com/office/drawing/2010/main" Requires="a14">
+      <mc:AlternateContent xmlns:mc="http://schemas.openxmlformats.org/markup-compatibility/2006" xmlns:a14="http://schemas.microsoft.com/office/drawing/2010/main">
+        <mc:Choice Requires="a14">
           <p:sp>
             <p:nvSpPr>
               <p:cNvPr id="18" name="Bubble sort">
@@ -6130,7 +6572,7 @@
               </a:ln>
               <a:extLst>
                 <a:ext uri="{C572A759-6A51-4108-AA02-DFA0A04FC94B}">
-                  <ma14:wrappingTextBoxFlag xmlns:ma14="http://schemas.microsoft.com/office/mac/drawingml/2011/main" xmlns:m="http://schemas.openxmlformats.org/officeDocument/2006/math" xmlns="" val="1"/>
+                  <ma14:wrappingTextBoxFlag xmlns="" xmlns:m="http://schemas.openxmlformats.org/officeDocument/2006/math" xmlns:ma14="http://schemas.microsoft.com/office/mac/drawingml/2011/main" val="1"/>
                 </a:ext>
               </a:extLst>
             </p:spPr>
@@ -6194,7 +6636,7 @@
             </p:txBody>
           </p:sp>
         </mc:Choice>
-        <mc:Fallback>
+        <mc:Fallback xmlns="">
           <p:sp>
             <p:nvSpPr>
               <p:cNvPr id="18" name="Bubble sort">
@@ -6218,7 +6660,7 @@
                 <a:avLst/>
               </a:prstGeom>
               <a:blipFill>
-                <a:blip r:embed="rId15"/>
+                <a:blip r:embed="rId16"/>
                 <a:stretch>
                   <a:fillRect l="-3599"/>
                 </a:stretch>
@@ -6247,8 +6689,8 @@
           </p:sp>
         </mc:Fallback>
       </mc:AlternateContent>
-      <mc:AlternateContent xmlns:mc="http://schemas.openxmlformats.org/markup-compatibility/2006">
-        <mc:Choice xmlns:a14="http://schemas.microsoft.com/office/drawing/2010/main" Requires="a14">
+      <mc:AlternateContent xmlns:mc="http://schemas.openxmlformats.org/markup-compatibility/2006" xmlns:a14="http://schemas.microsoft.com/office/drawing/2010/main">
+        <mc:Choice Requires="a14">
           <p:sp>
             <p:nvSpPr>
               <p:cNvPr id="19" name="Bubble sort">
@@ -6274,7 +6716,7 @@
               </a:ln>
               <a:extLst>
                 <a:ext uri="{C572A759-6A51-4108-AA02-DFA0A04FC94B}">
-                  <ma14:wrappingTextBoxFlag xmlns:ma14="http://schemas.microsoft.com/office/mac/drawingml/2011/main" xmlns:m="http://schemas.openxmlformats.org/officeDocument/2006/math" xmlns="" val="1"/>
+                  <ma14:wrappingTextBoxFlag xmlns="" xmlns:m="http://schemas.openxmlformats.org/officeDocument/2006/math" xmlns:ma14="http://schemas.microsoft.com/office/mac/drawingml/2011/main" val="1"/>
                 </a:ext>
               </a:extLst>
             </p:spPr>
@@ -6338,7 +6780,7 @@
             </p:txBody>
           </p:sp>
         </mc:Choice>
-        <mc:Fallback>
+        <mc:Fallback xmlns="">
           <p:sp>
             <p:nvSpPr>
               <p:cNvPr id="19" name="Bubble sort">
@@ -6362,7 +6804,7 @@
                 <a:avLst/>
               </a:prstGeom>
               <a:blipFill>
-                <a:blip r:embed="rId16"/>
+                <a:blip r:embed="rId17"/>
                 <a:stretch>
                   <a:fillRect l="-4370"/>
                 </a:stretch>
@@ -6391,8 +6833,8 @@
           </p:sp>
         </mc:Fallback>
       </mc:AlternateContent>
-      <mc:AlternateContent xmlns:mc="http://schemas.openxmlformats.org/markup-compatibility/2006">
-        <mc:Choice xmlns:a14="http://schemas.microsoft.com/office/drawing/2010/main" Requires="a14">
+      <mc:AlternateContent xmlns:mc="http://schemas.openxmlformats.org/markup-compatibility/2006" xmlns:a14="http://schemas.microsoft.com/office/drawing/2010/main">
+        <mc:Choice Requires="a14">
           <p:sp>
             <p:nvSpPr>
               <p:cNvPr id="20" name="Bubble sort">
@@ -6418,7 +6860,7 @@
               </a:ln>
               <a:extLst>
                 <a:ext uri="{C572A759-6A51-4108-AA02-DFA0A04FC94B}">
-                  <ma14:wrappingTextBoxFlag xmlns:ma14="http://schemas.microsoft.com/office/mac/drawingml/2011/main" xmlns:m="http://schemas.openxmlformats.org/officeDocument/2006/math" xmlns="" val="1"/>
+                  <ma14:wrappingTextBoxFlag xmlns="" xmlns:m="http://schemas.openxmlformats.org/officeDocument/2006/math" xmlns:ma14="http://schemas.microsoft.com/office/mac/drawingml/2011/main" val="1"/>
                 </a:ext>
               </a:extLst>
             </p:spPr>
@@ -6464,7 +6906,7 @@
             </p:txBody>
           </p:sp>
         </mc:Choice>
-        <mc:Fallback>
+        <mc:Fallback xmlns="">
           <p:sp>
             <p:nvSpPr>
               <p:cNvPr id="20" name="Bubble sort">
@@ -6488,7 +6930,7 @@
                 <a:avLst/>
               </a:prstGeom>
               <a:blipFill>
-                <a:blip r:embed="rId17"/>
+                <a:blip r:embed="rId18"/>
                 <a:stretch>
                   <a:fillRect l="-16438" t="-6767" b="-3759"/>
                 </a:stretch>
@@ -6517,8 +6959,8 @@
           </p:sp>
         </mc:Fallback>
       </mc:AlternateContent>
-      <mc:AlternateContent xmlns:mc="http://schemas.openxmlformats.org/markup-compatibility/2006">
-        <mc:Choice xmlns:a14="http://schemas.microsoft.com/office/drawing/2010/main" Requires="a14">
+      <mc:AlternateContent xmlns:mc="http://schemas.openxmlformats.org/markup-compatibility/2006" xmlns:a14="http://schemas.microsoft.com/office/drawing/2010/main">
+        <mc:Choice Requires="a14">
           <p:sp>
             <p:nvSpPr>
               <p:cNvPr id="21" name="Bubble sort">
@@ -6544,7 +6986,7 @@
               </a:ln>
               <a:extLst>
                 <a:ext uri="{C572A759-6A51-4108-AA02-DFA0A04FC94B}">
-                  <ma14:wrappingTextBoxFlag xmlns:ma14="http://schemas.microsoft.com/office/mac/drawingml/2011/main" xmlns:m="http://schemas.openxmlformats.org/officeDocument/2006/math" xmlns="" val="1"/>
+                  <ma14:wrappingTextBoxFlag xmlns="" xmlns:m="http://schemas.openxmlformats.org/officeDocument/2006/math" xmlns:ma14="http://schemas.microsoft.com/office/mac/drawingml/2011/main" val="1"/>
                 </a:ext>
               </a:extLst>
             </p:spPr>
@@ -6590,7 +7032,7 @@
             </p:txBody>
           </p:sp>
         </mc:Choice>
-        <mc:Fallback>
+        <mc:Fallback xmlns="">
           <p:sp>
             <p:nvSpPr>
               <p:cNvPr id="21" name="Bubble sort">
@@ -6614,7 +7056,7 @@
                 <a:avLst/>
               </a:prstGeom>
               <a:blipFill>
-                <a:blip r:embed="rId18"/>
+                <a:blip r:embed="rId19"/>
                 <a:stretch>
                   <a:fillRect l="-13699" t="-6015" b="-4511"/>
                 </a:stretch>
@@ -6643,8 +7085,8 @@
           </p:sp>
         </mc:Fallback>
       </mc:AlternateContent>
-      <mc:AlternateContent xmlns:mc="http://schemas.openxmlformats.org/markup-compatibility/2006">
-        <mc:Choice xmlns:a14="http://schemas.microsoft.com/office/drawing/2010/main" Requires="a14">
+      <mc:AlternateContent xmlns:mc="http://schemas.openxmlformats.org/markup-compatibility/2006" xmlns:a14="http://schemas.microsoft.com/office/drawing/2010/main">
+        <mc:Choice Requires="a14">
           <p:sp>
             <p:nvSpPr>
               <p:cNvPr id="22" name="Bubble sort">
@@ -6670,7 +7112,7 @@
               </a:ln>
               <a:extLst>
                 <a:ext uri="{C572A759-6A51-4108-AA02-DFA0A04FC94B}">
-                  <ma14:wrappingTextBoxFlag xmlns:ma14="http://schemas.microsoft.com/office/mac/drawingml/2011/main" xmlns:m="http://schemas.openxmlformats.org/officeDocument/2006/math" xmlns="" val="1"/>
+                  <ma14:wrappingTextBoxFlag xmlns="" xmlns:m="http://schemas.openxmlformats.org/officeDocument/2006/math" xmlns:ma14="http://schemas.microsoft.com/office/mac/drawingml/2011/main" val="1"/>
                 </a:ext>
               </a:extLst>
             </p:spPr>
@@ -6716,7 +7158,7 @@
             </p:txBody>
           </p:sp>
         </mc:Choice>
-        <mc:Fallback>
+        <mc:Fallback xmlns="">
           <p:sp>
             <p:nvSpPr>
               <p:cNvPr id="22" name="Bubble sort">
@@ -6740,7 +7182,7 @@
                 <a:avLst/>
               </a:prstGeom>
               <a:blipFill>
-                <a:blip r:embed="rId17"/>
+                <a:blip r:embed="rId18"/>
                 <a:stretch>
                   <a:fillRect l="-16438" t="-6015" b="-4511"/>
                 </a:stretch>
@@ -6792,9 +7234,6 @@
                     <p:cTn id="3" fill="hold">
                       <p:stCondLst>
                         <p:cond delay="indefinite"/>
-                        <p:cond evt="onBegin" delay="0">
-                          <p:tn val="2"/>
-                        </p:cond>
                       </p:stCondLst>
                       <p:childTnLst>
                         <p:par>
@@ -6804,7 +7243,7 @@
                             </p:stCondLst>
                             <p:childTnLst>
                               <p:par>
-                                <p:cTn id="5" presetID="1" presetClass="entr" presetSubtype="0" fill="hold" grpId="0" nodeType="withEffect">
+                                <p:cTn id="5" presetID="1" presetClass="entr" presetSubtype="0" fill="hold" nodeType="clickEffect">
                                   <p:stCondLst>
                                     <p:cond delay="0"/>
                                   </p:stCondLst>
@@ -6812,6 +7251,33 @@
                                     <p:set>
                                       <p:cBhvr>
                                         <p:cTn id="6" dur="1" fill="hold">
+                                          <p:stCondLst>
+                                            <p:cond delay="0"/>
+                                          </p:stCondLst>
+                                        </p:cTn>
+                                        <p:tgtEl>
+                                          <p:spTgt spid="6"/>
+                                        </p:tgtEl>
+                                        <p:attrNameLst>
+                                          <p:attrName>style.visibility</p:attrName>
+                                        </p:attrNameLst>
+                                      </p:cBhvr>
+                                      <p:to>
+                                        <p:strVal val="visible"/>
+                                      </p:to>
+                                    </p:set>
+                                  </p:childTnLst>
+                                </p:cTn>
+                              </p:par>
+                              <p:par>
+                                <p:cTn id="7" presetID="1" presetClass="entr" presetSubtype="0" fill="hold" grpId="1" nodeType="withEffect">
+                                  <p:stCondLst>
+                                    <p:cond delay="0"/>
+                                  </p:stCondLst>
+                                  <p:childTnLst>
+                                    <p:set>
+                                      <p:cBhvr>
+                                        <p:cTn id="8" dur="1" fill="hold">
                                           <p:stCondLst>
                                             <p:cond delay="0"/>
                                           </p:stCondLst>
@@ -6830,62 +7296,26 @@
                                   </p:childTnLst>
                                 </p:cTn>
                               </p:par>
+                            </p:childTnLst>
+                          </p:cTn>
+                        </p:par>
+                      </p:childTnLst>
+                    </p:cTn>
+                  </p:par>
+                  <p:par>
+                    <p:cTn id="9" fill="hold">
+                      <p:stCondLst>
+                        <p:cond delay="indefinite"/>
+                      </p:stCondLst>
+                      <p:childTnLst>
+                        <p:par>
+                          <p:cTn id="10" fill="hold">
+                            <p:stCondLst>
+                              <p:cond delay="0"/>
+                            </p:stCondLst>
+                            <p:childTnLst>
                               <p:par>
-                                <p:cTn id="7" presetID="1" presetClass="entr" presetSubtype="0" fill="hold" grpId="0" nodeType="withEffect">
-                                  <p:stCondLst>
-                                    <p:cond delay="0"/>
-                                  </p:stCondLst>
-                                  <p:childTnLst>
-                                    <p:set>
-                                      <p:cBhvr>
-                                        <p:cTn id="8" dur="1" fill="hold">
-                                          <p:stCondLst>
-                                            <p:cond delay="0"/>
-                                          </p:stCondLst>
-                                        </p:cTn>
-                                        <p:tgtEl>
-                                          <p:spTgt spid="9"/>
-                                        </p:tgtEl>
-                                        <p:attrNameLst>
-                                          <p:attrName>style.visibility</p:attrName>
-                                        </p:attrNameLst>
-                                      </p:cBhvr>
-                                      <p:to>
-                                        <p:strVal val="visible"/>
-                                      </p:to>
-                                    </p:set>
-                                  </p:childTnLst>
-                                </p:cTn>
-                              </p:par>
-                              <p:par>
-                                <p:cTn id="9" presetID="1" presetClass="entr" presetSubtype="0" fill="hold" grpId="0" nodeType="withEffect">
-                                  <p:stCondLst>
-                                    <p:cond delay="0"/>
-                                  </p:stCondLst>
-                                  <p:childTnLst>
-                                    <p:set>
-                                      <p:cBhvr>
-                                        <p:cTn id="10" dur="1" fill="hold">
-                                          <p:stCondLst>
-                                            <p:cond delay="0"/>
-                                          </p:stCondLst>
-                                        </p:cTn>
-                                        <p:tgtEl>
-                                          <p:spTgt spid="10"/>
-                                        </p:tgtEl>
-                                        <p:attrNameLst>
-                                          <p:attrName>style.visibility</p:attrName>
-                                        </p:attrNameLst>
-                                      </p:cBhvr>
-                                      <p:to>
-                                        <p:strVal val="visible"/>
-                                      </p:to>
-                                    </p:set>
-                                  </p:childTnLst>
-                                </p:cTn>
-                              </p:par>
-                              <p:par>
-                                <p:cTn id="11" presetID="1" presetClass="entr" presetSubtype="0" fill="hold" grpId="0" nodeType="withEffect">
+                                <p:cTn id="11" presetID="1" presetClass="entr" presetSubtype="0" fill="hold" grpId="1" nodeType="clickEffect">
                                   <p:stCondLst>
                                     <p:cond delay="0"/>
                                   </p:stCondLst>
@@ -6911,15 +7341,105 @@
                                   </p:childTnLst>
                                 </p:cTn>
                               </p:par>
+                            </p:childTnLst>
+                          </p:cTn>
+                        </p:par>
+                      </p:childTnLst>
+                    </p:cTn>
+                  </p:par>
+                  <p:par>
+                    <p:cTn id="13" fill="hold">
+                      <p:stCondLst>
+                        <p:cond delay="indefinite"/>
+                      </p:stCondLst>
+                      <p:childTnLst>
+                        <p:par>
+                          <p:cTn id="14" fill="hold">
+                            <p:stCondLst>
+                              <p:cond delay="0"/>
+                            </p:stCondLst>
+                            <p:childTnLst>
                               <p:par>
-                                <p:cTn id="13" presetID="1" presetClass="entr" presetSubtype="0" fill="hold" grpId="0" nodeType="withEffect">
+                                <p:cTn id="15" presetID="1" presetClass="entr" presetSubtype="0" fill="hold" nodeType="clickEffect">
                                   <p:stCondLst>
                                     <p:cond delay="0"/>
                                   </p:stCondLst>
                                   <p:childTnLst>
                                     <p:set>
                                       <p:cBhvr>
-                                        <p:cTn id="14" dur="1" fill="hold">
+                                        <p:cTn id="16" dur="1" fill="hold">
+                                          <p:stCondLst>
+                                            <p:cond delay="0"/>
+                                          </p:stCondLst>
+                                        </p:cTn>
+                                        <p:tgtEl>
+                                          <p:spTgt spid="5"/>
+                                        </p:tgtEl>
+                                        <p:attrNameLst>
+                                          <p:attrName>style.visibility</p:attrName>
+                                        </p:attrNameLst>
+                                      </p:cBhvr>
+                                      <p:to>
+                                        <p:strVal val="visible"/>
+                                      </p:to>
+                                    </p:set>
+                                  </p:childTnLst>
+                                </p:cTn>
+                              </p:par>
+                              <p:par>
+                                <p:cTn id="17" presetID="1" presetClass="entr" presetSubtype="0" fill="hold" grpId="1" nodeType="withEffect">
+                                  <p:stCondLst>
+                                    <p:cond delay="0"/>
+                                  </p:stCondLst>
+                                  <p:childTnLst>
+                                    <p:set>
+                                      <p:cBhvr>
+                                        <p:cTn id="18" dur="1" fill="hold">
+                                          <p:stCondLst>
+                                            <p:cond delay="0"/>
+                                          </p:stCondLst>
+                                        </p:cTn>
+                                        <p:tgtEl>
+                                          <p:spTgt spid="9"/>
+                                        </p:tgtEl>
+                                        <p:attrNameLst>
+                                          <p:attrName>style.visibility</p:attrName>
+                                        </p:attrNameLst>
+                                      </p:cBhvr>
+                                      <p:to>
+                                        <p:strVal val="visible"/>
+                                      </p:to>
+                                    </p:set>
+                                  </p:childTnLst>
+                                </p:cTn>
+                              </p:par>
+                            </p:childTnLst>
+                          </p:cTn>
+                        </p:par>
+                      </p:childTnLst>
+                    </p:cTn>
+                  </p:par>
+                  <p:par>
+                    <p:cTn id="19" fill="hold">
+                      <p:stCondLst>
+                        <p:cond delay="indefinite"/>
+                      </p:stCondLst>
+                      <p:childTnLst>
+                        <p:par>
+                          <p:cTn id="20" fill="hold">
+                            <p:stCondLst>
+                              <p:cond delay="0"/>
+                            </p:stCondLst>
+                            <p:childTnLst>
+                              <p:par>
+                                <p:cTn id="21" presetID="1" presetClass="entr" presetSubtype="0" fill="hold" grpId="1" nodeType="clickEffect">
+                                  <p:stCondLst>
+                                    <p:cond delay="0"/>
+                                  </p:stCondLst>
+                                  <p:childTnLst>
+                                    <p:set>
+                                      <p:cBhvr>
+                                        <p:cTn id="22" dur="1" fill="hold">
                                           <p:stCondLst>
                                             <p:cond delay="0"/>
                                           </p:stCondLst>
@@ -6938,15 +7458,105 @@
                                   </p:childTnLst>
                                 </p:cTn>
                               </p:par>
+                            </p:childTnLst>
+                          </p:cTn>
+                        </p:par>
+                      </p:childTnLst>
+                    </p:cTn>
+                  </p:par>
+                  <p:par>
+                    <p:cTn id="23" fill="hold">
+                      <p:stCondLst>
+                        <p:cond delay="indefinite"/>
+                      </p:stCondLst>
+                      <p:childTnLst>
+                        <p:par>
+                          <p:cTn id="24" fill="hold">
+                            <p:stCondLst>
+                              <p:cond delay="0"/>
+                            </p:stCondLst>
+                            <p:childTnLst>
                               <p:par>
-                                <p:cTn id="15" presetID="1" presetClass="entr" presetSubtype="0" fill="hold" grpId="0" nodeType="withEffect">
+                                <p:cTn id="25" presetID="1" presetClass="entr" presetSubtype="0" fill="hold" nodeType="clickEffect">
                                   <p:stCondLst>
                                     <p:cond delay="0"/>
                                   </p:stCondLst>
                                   <p:childTnLst>
                                     <p:set>
                                       <p:cBhvr>
-                                        <p:cTn id="16" dur="1" fill="hold">
+                                        <p:cTn id="26" dur="1" fill="hold">
+                                          <p:stCondLst>
+                                            <p:cond delay="0"/>
+                                          </p:stCondLst>
+                                        </p:cTn>
+                                        <p:tgtEl>
+                                          <p:spTgt spid="7"/>
+                                        </p:tgtEl>
+                                        <p:attrNameLst>
+                                          <p:attrName>style.visibility</p:attrName>
+                                        </p:attrNameLst>
+                                      </p:cBhvr>
+                                      <p:to>
+                                        <p:strVal val="visible"/>
+                                      </p:to>
+                                    </p:set>
+                                  </p:childTnLst>
+                                </p:cTn>
+                              </p:par>
+                              <p:par>
+                                <p:cTn id="27" presetID="1" presetClass="entr" presetSubtype="0" fill="hold" grpId="1" nodeType="withEffect">
+                                  <p:stCondLst>
+                                    <p:cond delay="0"/>
+                                  </p:stCondLst>
+                                  <p:childTnLst>
+                                    <p:set>
+                                      <p:cBhvr>
+                                        <p:cTn id="28" dur="1" fill="hold">
+                                          <p:stCondLst>
+                                            <p:cond delay="0"/>
+                                          </p:stCondLst>
+                                        </p:cTn>
+                                        <p:tgtEl>
+                                          <p:spTgt spid="10"/>
+                                        </p:tgtEl>
+                                        <p:attrNameLst>
+                                          <p:attrName>style.visibility</p:attrName>
+                                        </p:attrNameLst>
+                                      </p:cBhvr>
+                                      <p:to>
+                                        <p:strVal val="visible"/>
+                                      </p:to>
+                                    </p:set>
+                                  </p:childTnLst>
+                                </p:cTn>
+                              </p:par>
+                            </p:childTnLst>
+                          </p:cTn>
+                        </p:par>
+                      </p:childTnLst>
+                    </p:cTn>
+                  </p:par>
+                  <p:par>
+                    <p:cTn id="29" fill="hold">
+                      <p:stCondLst>
+                        <p:cond delay="indefinite"/>
+                      </p:stCondLst>
+                      <p:childTnLst>
+                        <p:par>
+                          <p:cTn id="30" fill="hold">
+                            <p:stCondLst>
+                              <p:cond delay="0"/>
+                            </p:stCondLst>
+                            <p:childTnLst>
+                              <p:par>
+                                <p:cTn id="31" presetID="1" presetClass="entr" presetSubtype="0" fill="hold" grpId="1" nodeType="clickEffect">
+                                  <p:stCondLst>
+                                    <p:cond delay="0"/>
+                                  </p:stCondLst>
+                                  <p:childTnLst>
+                                    <p:set>
+                                      <p:cBhvr>
+                                        <p:cTn id="32" dur="1" fill="hold">
                                           <p:stCondLst>
                                             <p:cond delay="0"/>
                                           </p:stCondLst>
@@ -6965,15 +7575,60 @@
                                   </p:childTnLst>
                                 </p:cTn>
                               </p:par>
+                            </p:childTnLst>
+                          </p:cTn>
+                        </p:par>
+                      </p:childTnLst>
+                    </p:cTn>
+                  </p:par>
+                  <p:par>
+                    <p:cTn id="33" fill="hold">
+                      <p:stCondLst>
+                        <p:cond delay="indefinite"/>
+                      </p:stCondLst>
+                      <p:childTnLst>
+                        <p:par>
+                          <p:cTn id="34" fill="hold">
+                            <p:stCondLst>
+                              <p:cond delay="0"/>
+                            </p:stCondLst>
+                            <p:childTnLst>
                               <p:par>
-                                <p:cTn id="17" presetID="1" presetClass="entr" presetSubtype="0" fill="hold" grpId="0" nodeType="withEffect">
+                                <p:cTn id="35" presetID="1" presetClass="entr" presetSubtype="0" fill="hold" nodeType="clickEffect">
                                   <p:stCondLst>
                                     <p:cond delay="0"/>
                                   </p:stCondLst>
                                   <p:childTnLst>
                                     <p:set>
                                       <p:cBhvr>
-                                        <p:cTn id="18" dur="1" fill="hold">
+                                        <p:cTn id="36" dur="1" fill="hold">
+                                          <p:stCondLst>
+                                            <p:cond delay="0"/>
+                                          </p:stCondLst>
+                                        </p:cTn>
+                                        <p:tgtEl>
+                                          <p:spTgt spid="14"/>
+                                        </p:tgtEl>
+                                        <p:attrNameLst>
+                                          <p:attrName>style.visibility</p:attrName>
+                                        </p:attrNameLst>
+                                      </p:cBhvr>
+                                      <p:to>
+                                        <p:strVal val="visible"/>
+                                      </p:to>
+                                    </p:set>
+                                  </p:childTnLst>
+                                </p:cTn>
+                              </p:par>
+                              <p:par>
+                                <p:cTn id="37" presetID="1" presetClass="entr" presetSubtype="0" fill="hold" grpId="1" nodeType="withEffect">
+                                  <p:stCondLst>
+                                    <p:cond delay="0"/>
+                                  </p:stCondLst>
+                                  <p:childTnLst>
+                                    <p:set>
+                                      <p:cBhvr>
+                                        <p:cTn id="38" dur="1" fill="hold">
                                           <p:stCondLst>
                                             <p:cond delay="0"/>
                                           </p:stCondLst>
@@ -6992,15 +7647,105 @@
                                   </p:childTnLst>
                                 </p:cTn>
                               </p:par>
+                            </p:childTnLst>
+                          </p:cTn>
+                        </p:par>
+                      </p:childTnLst>
+                    </p:cTn>
+                  </p:par>
+                  <p:par>
+                    <p:cTn id="39" fill="hold">
+                      <p:stCondLst>
+                        <p:cond delay="indefinite"/>
+                      </p:stCondLst>
+                      <p:childTnLst>
+                        <p:par>
+                          <p:cTn id="40" fill="hold">
+                            <p:stCondLst>
+                              <p:cond delay="0"/>
+                            </p:stCondLst>
+                            <p:childTnLst>
                               <p:par>
-                                <p:cTn id="19" presetID="1" presetClass="entr" presetSubtype="0" fill="hold" grpId="0" nodeType="withEffect">
+                                <p:cTn id="41" presetID="1" presetClass="entr" presetSubtype="0" fill="hold" grpId="1" nodeType="clickEffect">
                                   <p:stCondLst>
                                     <p:cond delay="0"/>
                                   </p:stCondLst>
                                   <p:childTnLst>
                                     <p:set>
                                       <p:cBhvr>
-                                        <p:cTn id="20" dur="1" fill="hold">
+                                        <p:cTn id="42" dur="1" fill="hold">
+                                          <p:stCondLst>
+                                            <p:cond delay="0"/>
+                                          </p:stCondLst>
+                                        </p:cTn>
+                                        <p:tgtEl>
+                                          <p:spTgt spid="20"/>
+                                        </p:tgtEl>
+                                        <p:attrNameLst>
+                                          <p:attrName>style.visibility</p:attrName>
+                                        </p:attrNameLst>
+                                      </p:cBhvr>
+                                      <p:to>
+                                        <p:strVal val="visible"/>
+                                      </p:to>
+                                    </p:set>
+                                  </p:childTnLst>
+                                </p:cTn>
+                              </p:par>
+                            </p:childTnLst>
+                          </p:cTn>
+                        </p:par>
+                      </p:childTnLst>
+                    </p:cTn>
+                  </p:par>
+                  <p:par>
+                    <p:cTn id="43" fill="hold">
+                      <p:stCondLst>
+                        <p:cond delay="indefinite"/>
+                      </p:stCondLst>
+                      <p:childTnLst>
+                        <p:par>
+                          <p:cTn id="44" fill="hold">
+                            <p:stCondLst>
+                              <p:cond delay="0"/>
+                            </p:stCondLst>
+                            <p:childTnLst>
+                              <p:par>
+                                <p:cTn id="45" presetID="1" presetClass="entr" presetSubtype="0" fill="hold" nodeType="clickEffect">
+                                  <p:stCondLst>
+                                    <p:cond delay="0"/>
+                                  </p:stCondLst>
+                                  <p:childTnLst>
+                                    <p:set>
+                                      <p:cBhvr>
+                                        <p:cTn id="46" dur="1" fill="hold">
+                                          <p:stCondLst>
+                                            <p:cond delay="0"/>
+                                          </p:stCondLst>
+                                        </p:cTn>
+                                        <p:tgtEl>
+                                          <p:spTgt spid="15"/>
+                                        </p:tgtEl>
+                                        <p:attrNameLst>
+                                          <p:attrName>style.visibility</p:attrName>
+                                        </p:attrNameLst>
+                                      </p:cBhvr>
+                                      <p:to>
+                                        <p:strVal val="visible"/>
+                                      </p:to>
+                                    </p:set>
+                                  </p:childTnLst>
+                                </p:cTn>
+                              </p:par>
+                              <p:par>
+                                <p:cTn id="47" presetID="1" presetClass="entr" presetSubtype="0" fill="hold" grpId="1" nodeType="withEffect">
+                                  <p:stCondLst>
+                                    <p:cond delay="0"/>
+                                  </p:stCondLst>
+                                  <p:childTnLst>
+                                    <p:set>
+                                      <p:cBhvr>
+                                        <p:cTn id="48" dur="1" fill="hold">
                                           <p:stCondLst>
                                             <p:cond delay="0"/>
                                           </p:stCondLst>
@@ -7019,15 +7764,105 @@
                                   </p:childTnLst>
                                 </p:cTn>
                               </p:par>
+                            </p:childTnLst>
+                          </p:cTn>
+                        </p:par>
+                      </p:childTnLst>
+                    </p:cTn>
+                  </p:par>
+                  <p:par>
+                    <p:cTn id="49" fill="hold">
+                      <p:stCondLst>
+                        <p:cond delay="indefinite"/>
+                      </p:stCondLst>
+                      <p:childTnLst>
+                        <p:par>
+                          <p:cTn id="50" fill="hold">
+                            <p:stCondLst>
+                              <p:cond delay="0"/>
+                            </p:stCondLst>
+                            <p:childTnLst>
                               <p:par>
-                                <p:cTn id="21" presetID="1" presetClass="entr" presetSubtype="0" fill="hold" grpId="0" nodeType="withEffect">
+                                <p:cTn id="51" presetID="1" presetClass="entr" presetSubtype="0" fill="hold" grpId="1" nodeType="clickEffect">
                                   <p:stCondLst>
                                     <p:cond delay="0"/>
                                   </p:stCondLst>
                                   <p:childTnLst>
                                     <p:set>
                                       <p:cBhvr>
-                                        <p:cTn id="22" dur="1" fill="hold">
+                                        <p:cTn id="52" dur="1" fill="hold">
+                                          <p:stCondLst>
+                                            <p:cond delay="0"/>
+                                          </p:stCondLst>
+                                        </p:cTn>
+                                        <p:tgtEl>
+                                          <p:spTgt spid="21"/>
+                                        </p:tgtEl>
+                                        <p:attrNameLst>
+                                          <p:attrName>style.visibility</p:attrName>
+                                        </p:attrNameLst>
+                                      </p:cBhvr>
+                                      <p:to>
+                                        <p:strVal val="visible"/>
+                                      </p:to>
+                                    </p:set>
+                                  </p:childTnLst>
+                                </p:cTn>
+                              </p:par>
+                            </p:childTnLst>
+                          </p:cTn>
+                        </p:par>
+                      </p:childTnLst>
+                    </p:cTn>
+                  </p:par>
+                  <p:par>
+                    <p:cTn id="53" fill="hold">
+                      <p:stCondLst>
+                        <p:cond delay="indefinite"/>
+                      </p:stCondLst>
+                      <p:childTnLst>
+                        <p:par>
+                          <p:cTn id="54" fill="hold">
+                            <p:stCondLst>
+                              <p:cond delay="0"/>
+                            </p:stCondLst>
+                            <p:childTnLst>
+                              <p:par>
+                                <p:cTn id="55" presetID="1" presetClass="entr" presetSubtype="0" fill="hold" nodeType="clickEffect">
+                                  <p:stCondLst>
+                                    <p:cond delay="0"/>
+                                  </p:stCondLst>
+                                  <p:childTnLst>
+                                    <p:set>
+                                      <p:cBhvr>
+                                        <p:cTn id="56" dur="1" fill="hold">
+                                          <p:stCondLst>
+                                            <p:cond delay="0"/>
+                                          </p:stCondLst>
+                                        </p:cTn>
+                                        <p:tgtEl>
+                                          <p:spTgt spid="16"/>
+                                        </p:tgtEl>
+                                        <p:attrNameLst>
+                                          <p:attrName>style.visibility</p:attrName>
+                                        </p:attrNameLst>
+                                      </p:cBhvr>
+                                      <p:to>
+                                        <p:strVal val="visible"/>
+                                      </p:to>
+                                    </p:set>
+                                  </p:childTnLst>
+                                </p:cTn>
+                              </p:par>
+                              <p:par>
+                                <p:cTn id="57" presetID="1" presetClass="entr" presetSubtype="0" fill="hold" grpId="1" nodeType="withEffect">
+                                  <p:stCondLst>
+                                    <p:cond delay="0"/>
+                                  </p:stCondLst>
+                                  <p:childTnLst>
+                                    <p:set>
+                                      <p:cBhvr>
+                                        <p:cTn id="58" dur="1" fill="hold">
                                           <p:stCondLst>
                                             <p:cond delay="0"/>
                                           </p:stCondLst>
@@ -7046,69 +7881,33 @@
                                   </p:childTnLst>
                                 </p:cTn>
                               </p:par>
+                            </p:childTnLst>
+                          </p:cTn>
+                        </p:par>
+                      </p:childTnLst>
+                    </p:cTn>
+                  </p:par>
+                  <p:par>
+                    <p:cTn id="59" fill="hold">
+                      <p:stCondLst>
+                        <p:cond delay="indefinite"/>
+                      </p:stCondLst>
+                      <p:childTnLst>
+                        <p:par>
+                          <p:cTn id="60" fill="hold">
+                            <p:stCondLst>
+                              <p:cond delay="0"/>
+                            </p:stCondLst>
+                            <p:childTnLst>
                               <p:par>
-                                <p:cTn id="23" presetID="1" presetClass="entr" presetSubtype="0" fill="hold" grpId="0" nodeType="withEffect">
+                                <p:cTn id="61" presetID="1" presetClass="entr" presetSubtype="0" fill="hold" grpId="1" nodeType="clickEffect">
                                   <p:stCondLst>
                                     <p:cond delay="0"/>
                                   </p:stCondLst>
                                   <p:childTnLst>
                                     <p:set>
                                       <p:cBhvr>
-                                        <p:cTn id="24" dur="1" fill="hold">
-                                          <p:stCondLst>
-                                            <p:cond delay="0"/>
-                                          </p:stCondLst>
-                                        </p:cTn>
-                                        <p:tgtEl>
-                                          <p:spTgt spid="20"/>
-                                        </p:tgtEl>
-                                        <p:attrNameLst>
-                                          <p:attrName>style.visibility</p:attrName>
-                                        </p:attrNameLst>
-                                      </p:cBhvr>
-                                      <p:to>
-                                        <p:strVal val="visible"/>
-                                      </p:to>
-                                    </p:set>
-                                  </p:childTnLst>
-                                </p:cTn>
-                              </p:par>
-                              <p:par>
-                                <p:cTn id="25" presetID="1" presetClass="entr" presetSubtype="0" fill="hold" grpId="0" nodeType="withEffect">
-                                  <p:stCondLst>
-                                    <p:cond delay="0"/>
-                                  </p:stCondLst>
-                                  <p:childTnLst>
-                                    <p:set>
-                                      <p:cBhvr>
-                                        <p:cTn id="26" dur="1" fill="hold">
-                                          <p:stCondLst>
-                                            <p:cond delay="0"/>
-                                          </p:stCondLst>
-                                        </p:cTn>
-                                        <p:tgtEl>
-                                          <p:spTgt spid="21"/>
-                                        </p:tgtEl>
-                                        <p:attrNameLst>
-                                          <p:attrName>style.visibility</p:attrName>
-                                        </p:attrNameLst>
-                                      </p:cBhvr>
-                                      <p:to>
-                                        <p:strVal val="visible"/>
-                                      </p:to>
-                                    </p:set>
-                                  </p:childTnLst>
-                                </p:cTn>
-                              </p:par>
-                              <p:par>
-                                <p:cTn id="27" presetID="1" presetClass="entr" presetSubtype="0" fill="hold" grpId="0" nodeType="withEffect">
-                                  <p:stCondLst>
-                                    <p:cond delay="0"/>
-                                  </p:stCondLst>
-                                  <p:childTnLst>
-                                    <p:set>
-                                      <p:cBhvr>
-                                        <p:cTn id="28" dur="1" fill="hold">
+                                        <p:cTn id="62" dur="1" fill="hold">
                                           <p:stCondLst>
                                             <p:cond delay="0"/>
                                           </p:stCondLst>
@@ -7155,24 +7954,24 @@
       </p:par>
     </p:tnLst>
     <p:bldLst>
-      <p:bldP spid="8" grpId="0" animBg="1"/>
-      <p:bldP spid="9" grpId="0" animBg="1"/>
-      <p:bldP spid="10" grpId="0" animBg="1"/>
-      <p:bldP spid="11" grpId="0" animBg="1"/>
-      <p:bldP spid="12" grpId="0" animBg="1"/>
-      <p:bldP spid="13" grpId="0" animBg="1"/>
-      <p:bldP spid="17" grpId="0" animBg="1"/>
-      <p:bldP spid="18" grpId="0" animBg="1"/>
-      <p:bldP spid="19" grpId="0" animBg="1"/>
-      <p:bldP spid="20" grpId="0" animBg="1"/>
-      <p:bldP spid="21" grpId="0" animBg="1"/>
-      <p:bldP spid="22" grpId="0" animBg="1"/>
+      <p:bldP spid="8" grpId="1" animBg="1"/>
+      <p:bldP spid="9" grpId="1" animBg="1"/>
+      <p:bldP spid="10" grpId="1" animBg="1"/>
+      <p:bldP spid="11" grpId="1" animBg="1"/>
+      <p:bldP spid="12" grpId="1" animBg="1"/>
+      <p:bldP spid="13" grpId="1" animBg="1"/>
+      <p:bldP spid="17" grpId="1" animBg="1"/>
+      <p:bldP spid="18" grpId="1" animBg="1"/>
+      <p:bldP spid="19" grpId="1" animBg="1"/>
+      <p:bldP spid="20" grpId="1" animBg="1"/>
+      <p:bldP spid="21" grpId="1" animBg="1"/>
+      <p:bldP spid="22" grpId="1" animBg="1"/>
     </p:bldLst>
   </p:timing>
 </p:sld>
 </file>
 
-<file path=ppt/slides/slide4.xml><?xml version="1.0" encoding="utf-8"?>
+<file path=ppt/slides/slide5.xml><?xml version="1.0" encoding="utf-8"?>
 <p:sld xmlns:a="http://schemas.openxmlformats.org/drawingml/2006/main" xmlns:r="http://schemas.openxmlformats.org/officeDocument/2006/relationships" xmlns:p="http://schemas.openxmlformats.org/presentationml/2006/main">
   <p:cSld>
     <p:spTree>
@@ -7217,8 +8016,8 @@
           </a:p>
         </p:txBody>
       </p:sp>
-      <mc:AlternateContent xmlns:mc="http://schemas.openxmlformats.org/markup-compatibility/2006">
-        <mc:Choice xmlns:a14="http://schemas.microsoft.com/office/drawing/2010/main" Requires="a14">
+      <mc:AlternateContent xmlns:mc="http://schemas.openxmlformats.org/markup-compatibility/2006" xmlns:a14="http://schemas.microsoft.com/office/drawing/2010/main">
+        <mc:Choice Requires="a14">
           <p:sp>
             <p:nvSpPr>
               <p:cNvPr id="17" name="Bubble sort">
@@ -7244,7 +8043,7 @@
               </a:ln>
               <a:extLst>
                 <a:ext uri="{C572A759-6A51-4108-AA02-DFA0A04FC94B}">
-                  <ma14:wrappingTextBoxFlag xmlns:ma14="http://schemas.microsoft.com/office/mac/drawingml/2011/main" xmlns:m="http://schemas.openxmlformats.org/officeDocument/2006/math" xmlns="" val="1"/>
+                  <ma14:wrappingTextBoxFlag xmlns="" xmlns:m="http://schemas.openxmlformats.org/officeDocument/2006/math" xmlns:ma14="http://schemas.microsoft.com/office/mac/drawingml/2011/main" val="1"/>
                 </a:ext>
               </a:extLst>
             </p:spPr>
@@ -7391,7 +8190,7 @@
             </p:txBody>
           </p:sp>
         </mc:Choice>
-        <mc:Fallback>
+        <mc:Fallback xmlns="">
           <p:sp>
             <p:nvSpPr>
               <p:cNvPr id="17" name="Bubble sort">
@@ -7444,8 +8243,8 @@
           </p:sp>
         </mc:Fallback>
       </mc:AlternateContent>
-      <mc:AlternateContent xmlns:mc="http://schemas.openxmlformats.org/markup-compatibility/2006">
-        <mc:Choice xmlns:a14="http://schemas.microsoft.com/office/drawing/2010/main" Requires="a14">
+      <mc:AlternateContent xmlns:mc="http://schemas.openxmlformats.org/markup-compatibility/2006" xmlns:a14="http://schemas.microsoft.com/office/drawing/2010/main">
+        <mc:Choice Requires="a14">
           <p:sp>
             <p:nvSpPr>
               <p:cNvPr id="3" name="Bubble sort">
@@ -7471,7 +8270,7 @@
               </a:ln>
               <a:extLst>
                 <a:ext uri="{C572A759-6A51-4108-AA02-DFA0A04FC94B}">
-                  <ma14:wrappingTextBoxFlag xmlns:ma14="http://schemas.microsoft.com/office/mac/drawingml/2011/main" xmlns:m="http://schemas.openxmlformats.org/officeDocument/2006/math" xmlns="" val="1"/>
+                  <ma14:wrappingTextBoxFlag xmlns="" xmlns:m="http://schemas.openxmlformats.org/officeDocument/2006/math" xmlns:ma14="http://schemas.microsoft.com/office/mac/drawingml/2011/main" val="1"/>
                 </a:ext>
               </a:extLst>
             </p:spPr>
@@ -7600,7 +8399,7 @@
             </p:txBody>
           </p:sp>
         </mc:Choice>
-        <mc:Fallback>
+        <mc:Fallback xmlns="">
           <p:sp>
             <p:nvSpPr>
               <p:cNvPr id="3" name="Bubble sort">
@@ -7653,8 +8452,8 @@
           </p:sp>
         </mc:Fallback>
       </mc:AlternateContent>
-      <mc:AlternateContent xmlns:mc="http://schemas.openxmlformats.org/markup-compatibility/2006">
-        <mc:Choice xmlns:a14="http://schemas.microsoft.com/office/drawing/2010/main" Requires="a14">
+      <mc:AlternateContent xmlns:mc="http://schemas.openxmlformats.org/markup-compatibility/2006" xmlns:a14="http://schemas.microsoft.com/office/drawing/2010/main">
+        <mc:Choice Requires="a14">
           <p:sp>
             <p:nvSpPr>
               <p:cNvPr id="4" name="Bubble sort">
@@ -7680,7 +8479,7 @@
               </a:ln>
               <a:extLst>
                 <a:ext uri="{C572A759-6A51-4108-AA02-DFA0A04FC94B}">
-                  <ma14:wrappingTextBoxFlag xmlns:ma14="http://schemas.microsoft.com/office/mac/drawingml/2011/main" xmlns:m="http://schemas.openxmlformats.org/officeDocument/2006/math" xmlns="" val="1"/>
+                  <ma14:wrappingTextBoxFlag xmlns="" xmlns:m="http://schemas.openxmlformats.org/officeDocument/2006/math" xmlns:ma14="http://schemas.microsoft.com/office/mac/drawingml/2011/main" val="1"/>
                 </a:ext>
               </a:extLst>
             </p:spPr>
@@ -7815,7 +8614,7 @@
             </p:txBody>
           </p:sp>
         </mc:Choice>
-        <mc:Fallback>
+        <mc:Fallback xmlns="">
           <p:sp>
             <p:nvSpPr>
               <p:cNvPr id="4" name="Bubble sort">
@@ -7929,15 +8728,33 @@
                                   </p:childTnLst>
                                 </p:cTn>
                               </p:par>
+                            </p:childTnLst>
+                          </p:cTn>
+                        </p:par>
+                      </p:childTnLst>
+                    </p:cTn>
+                  </p:par>
+                  <p:par>
+                    <p:cTn id="7" fill="hold">
+                      <p:stCondLst>
+                        <p:cond delay="indefinite"/>
+                      </p:stCondLst>
+                      <p:childTnLst>
+                        <p:par>
+                          <p:cTn id="8" fill="hold">
+                            <p:stCondLst>
+                              <p:cond delay="0"/>
+                            </p:stCondLst>
+                            <p:childTnLst>
                               <p:par>
-                                <p:cTn id="7" presetID="1" presetClass="entr" presetSubtype="0" fill="hold" grpId="0" nodeType="withEffect">
+                                <p:cTn id="9" presetID="1" presetClass="entr" presetSubtype="0" fill="hold" grpId="0" nodeType="clickEffect">
                                   <p:stCondLst>
                                     <p:cond delay="0"/>
                                   </p:stCondLst>
                                   <p:childTnLst>
                                     <p:set>
                                       <p:cBhvr>
-                                        <p:cTn id="8" dur="1" fill="hold">
+                                        <p:cTn id="10" dur="1" fill="hold">
                                           <p:stCondLst>
                                             <p:cond delay="0"/>
                                           </p:stCondLst>
@@ -7956,15 +8773,33 @@
                                   </p:childTnLst>
                                 </p:cTn>
                               </p:par>
+                            </p:childTnLst>
+                          </p:cTn>
+                        </p:par>
+                      </p:childTnLst>
+                    </p:cTn>
+                  </p:par>
+                  <p:par>
+                    <p:cTn id="11" fill="hold">
+                      <p:stCondLst>
+                        <p:cond delay="indefinite"/>
+                      </p:stCondLst>
+                      <p:childTnLst>
+                        <p:par>
+                          <p:cTn id="12" fill="hold">
+                            <p:stCondLst>
+                              <p:cond delay="0"/>
+                            </p:stCondLst>
+                            <p:childTnLst>
                               <p:par>
-                                <p:cTn id="9" presetID="1" presetClass="entr" presetSubtype="0" fill="hold" grpId="0" nodeType="withEffect">
+                                <p:cTn id="13" presetID="1" presetClass="entr" presetSubtype="0" fill="hold" grpId="0" nodeType="clickEffect">
                                   <p:stCondLst>
                                     <p:cond delay="0"/>
                                   </p:stCondLst>
                                   <p:childTnLst>
                                     <p:set>
                                       <p:cBhvr>
-                                        <p:cTn id="10" dur="1" fill="hold">
+                                        <p:cTn id="14" dur="1" fill="hold">
                                           <p:stCondLst>
                                             <p:cond delay="0"/>
                                           </p:stCondLst>
@@ -8019,7 +8854,7 @@
 </p:sld>
 </file>
 
-<file path=ppt/slides/slide5.xml><?xml version="1.0" encoding="utf-8"?>
+<file path=ppt/slides/slide6.xml><?xml version="1.0" encoding="utf-8"?>
 <p:sld xmlns:a="http://schemas.openxmlformats.org/drawingml/2006/main" xmlns:r="http://schemas.openxmlformats.org/officeDocument/2006/relationships" xmlns:p="http://schemas.openxmlformats.org/presentationml/2006/main">
   <p:cSld>
     <p:spTree>
@@ -8064,8 +8899,8 @@
           </a:p>
         </p:txBody>
       </p:sp>
-      <mc:AlternateContent xmlns:mc="http://schemas.openxmlformats.org/markup-compatibility/2006">
-        <mc:Choice xmlns:a14="http://schemas.microsoft.com/office/drawing/2010/main" Requires="a14">
+      <mc:AlternateContent xmlns:mc="http://schemas.openxmlformats.org/markup-compatibility/2006" xmlns:a14="http://schemas.microsoft.com/office/drawing/2010/main">
+        <mc:Choice Requires="a14">
           <p:sp>
             <p:nvSpPr>
               <p:cNvPr id="17" name="Bubble sort">
@@ -8091,7 +8926,7 @@
               </a:ln>
               <a:extLst>
                 <a:ext uri="{C572A759-6A51-4108-AA02-DFA0A04FC94B}">
-                  <ma14:wrappingTextBoxFlag xmlns:ma14="http://schemas.microsoft.com/office/mac/drawingml/2011/main" xmlns:m="http://schemas.openxmlformats.org/officeDocument/2006/math" xmlns="" val="1"/>
+                  <ma14:wrappingTextBoxFlag xmlns="" xmlns:m="http://schemas.openxmlformats.org/officeDocument/2006/math" xmlns:ma14="http://schemas.microsoft.com/office/mac/drawingml/2011/main" val="1"/>
                 </a:ext>
               </a:extLst>
             </p:spPr>
@@ -8209,7 +9044,7 @@
             </p:txBody>
           </p:sp>
         </mc:Choice>
-        <mc:Fallback>
+        <mc:Fallback xmlns="">
           <p:sp>
             <p:nvSpPr>
               <p:cNvPr id="17" name="Bubble sort">
@@ -8262,8 +9097,8 @@
           </p:sp>
         </mc:Fallback>
       </mc:AlternateContent>
-      <mc:AlternateContent xmlns:mc="http://schemas.openxmlformats.org/markup-compatibility/2006">
-        <mc:Choice xmlns:a14="http://schemas.microsoft.com/office/drawing/2010/main" Requires="a14">
+      <mc:AlternateContent xmlns:mc="http://schemas.openxmlformats.org/markup-compatibility/2006" xmlns:a14="http://schemas.microsoft.com/office/drawing/2010/main">
+        <mc:Choice Requires="a14">
           <p:sp>
             <p:nvSpPr>
               <p:cNvPr id="3" name="Bubble sort">
@@ -8289,7 +9124,7 @@
               </a:ln>
               <a:extLst>
                 <a:ext uri="{C572A759-6A51-4108-AA02-DFA0A04FC94B}">
-                  <ma14:wrappingTextBoxFlag xmlns:ma14="http://schemas.microsoft.com/office/mac/drawingml/2011/main" xmlns:m="http://schemas.openxmlformats.org/officeDocument/2006/math" xmlns="" val="1"/>
+                  <ma14:wrappingTextBoxFlag xmlns="" xmlns:m="http://schemas.openxmlformats.org/officeDocument/2006/math" xmlns:ma14="http://schemas.microsoft.com/office/mac/drawingml/2011/main" val="1"/>
                 </a:ext>
               </a:extLst>
             </p:spPr>
@@ -8419,7 +9254,7 @@
             </p:txBody>
           </p:sp>
         </mc:Choice>
-        <mc:Fallback>
+        <mc:Fallback xmlns="">
           <p:sp>
             <p:nvSpPr>
               <p:cNvPr id="3" name="Bubble sort">
@@ -8472,8 +9307,8 @@
           </p:sp>
         </mc:Fallback>
       </mc:AlternateContent>
-      <mc:AlternateContent xmlns:mc="http://schemas.openxmlformats.org/markup-compatibility/2006">
-        <mc:Choice xmlns:a14="http://schemas.microsoft.com/office/drawing/2010/main" Requires="a14">
+      <mc:AlternateContent xmlns:mc="http://schemas.openxmlformats.org/markup-compatibility/2006" xmlns:a14="http://schemas.microsoft.com/office/drawing/2010/main">
+        <mc:Choice Requires="a14">
           <p:sp>
             <p:nvSpPr>
               <p:cNvPr id="5" name="Bubble sort">
@@ -8499,7 +9334,7 @@
               </a:ln>
               <a:extLst>
                 <a:ext uri="{C572A759-6A51-4108-AA02-DFA0A04FC94B}">
-                  <ma14:wrappingTextBoxFlag xmlns:ma14="http://schemas.microsoft.com/office/mac/drawingml/2011/main" xmlns:m="http://schemas.openxmlformats.org/officeDocument/2006/math" xmlns="" val="1"/>
+                  <ma14:wrappingTextBoxFlag xmlns="" xmlns:m="http://schemas.openxmlformats.org/officeDocument/2006/math" xmlns:ma14="http://schemas.microsoft.com/office/mac/drawingml/2011/main" val="1"/>
                 </a:ext>
               </a:extLst>
             </p:spPr>
@@ -8617,7 +9452,7 @@
             </p:txBody>
           </p:sp>
         </mc:Choice>
-        <mc:Fallback>
+        <mc:Fallback xmlns="">
           <p:sp>
             <p:nvSpPr>
               <p:cNvPr id="5" name="Bubble sort">
@@ -8693,9 +9528,6 @@
                     <p:cTn id="3" fill="hold">
                       <p:stCondLst>
                         <p:cond delay="indefinite"/>
-                        <p:cond evt="onBegin" delay="0">
-                          <p:tn val="2"/>
-                        </p:cond>
                       </p:stCondLst>
                       <p:childTnLst>
                         <p:par>
@@ -8705,7 +9537,7 @@
                             </p:stCondLst>
                             <p:childTnLst>
                               <p:par>
-                                <p:cTn id="5" presetID="1" presetClass="entr" presetSubtype="0" fill="hold" grpId="0" nodeType="withEffect">
+                                <p:cTn id="5" presetID="1" presetClass="entr" presetSubtype="0" fill="hold" grpId="0" nodeType="clickEffect">
                                   <p:stCondLst>
                                     <p:cond delay="0"/>
                                   </p:stCondLst>
@@ -8731,15 +9563,33 @@
                                   </p:childTnLst>
                                 </p:cTn>
                               </p:par>
+                            </p:childTnLst>
+                          </p:cTn>
+                        </p:par>
+                      </p:childTnLst>
+                    </p:cTn>
+                  </p:par>
+                  <p:par>
+                    <p:cTn id="7" fill="hold">
+                      <p:stCondLst>
+                        <p:cond delay="indefinite"/>
+                      </p:stCondLst>
+                      <p:childTnLst>
+                        <p:par>
+                          <p:cTn id="8" fill="hold">
+                            <p:stCondLst>
+                              <p:cond delay="0"/>
+                            </p:stCondLst>
+                            <p:childTnLst>
                               <p:par>
-                                <p:cTn id="7" presetID="1" presetClass="entr" presetSubtype="0" fill="hold" grpId="0" nodeType="withEffect">
+                                <p:cTn id="9" presetID="1" presetClass="entr" presetSubtype="0" fill="hold" grpId="0" nodeType="clickEffect">
                                   <p:stCondLst>
                                     <p:cond delay="0"/>
                                   </p:stCondLst>
                                   <p:childTnLst>
                                     <p:set>
                                       <p:cBhvr>
-                                        <p:cTn id="8" dur="1" fill="hold">
+                                        <p:cTn id="10" dur="1" fill="hold">
                                           <p:stCondLst>
                                             <p:cond delay="0"/>
                                           </p:stCondLst>
@@ -8758,15 +9608,33 @@
                                   </p:childTnLst>
                                 </p:cTn>
                               </p:par>
+                            </p:childTnLst>
+                          </p:cTn>
+                        </p:par>
+                      </p:childTnLst>
+                    </p:cTn>
+                  </p:par>
+                  <p:par>
+                    <p:cTn id="11" fill="hold">
+                      <p:stCondLst>
+                        <p:cond delay="indefinite"/>
+                      </p:stCondLst>
+                      <p:childTnLst>
+                        <p:par>
+                          <p:cTn id="12" fill="hold">
+                            <p:stCondLst>
+                              <p:cond delay="0"/>
+                            </p:stCondLst>
+                            <p:childTnLst>
                               <p:par>
-                                <p:cTn id="9" presetID="1" presetClass="entr" presetSubtype="0" fill="hold" grpId="0" nodeType="withEffect">
+                                <p:cTn id="13" presetID="1" presetClass="entr" presetSubtype="0" fill="hold" grpId="0" nodeType="clickEffect">
                                   <p:stCondLst>
                                     <p:cond delay="0"/>
                                   </p:stCondLst>
                                   <p:childTnLst>
                                     <p:set>
                                       <p:cBhvr>
-                                        <p:cTn id="10" dur="1" fill="hold">
+                                        <p:cTn id="14" dur="1" fill="hold">
                                           <p:stCondLst>
                                             <p:cond delay="0"/>
                                           </p:stCondLst>
@@ -8821,7 +9689,7 @@
 </p:sld>
 </file>
 
-<file path=ppt/slides/slide6.xml><?xml version="1.0" encoding="utf-8"?>
+<file path=ppt/slides/slide7.xml><?xml version="1.0" encoding="utf-8"?>
 <p:sld xmlns:a="http://schemas.openxmlformats.org/drawingml/2006/main" xmlns:r="http://schemas.openxmlformats.org/officeDocument/2006/relationships" xmlns:p="http://schemas.openxmlformats.org/presentationml/2006/main">
   <p:cSld>
     <p:spTree>
@@ -8865,8 +9733,8 @@
           </a:p>
         </p:txBody>
       </p:sp>
-      <mc:AlternateContent xmlns:mc="http://schemas.openxmlformats.org/markup-compatibility/2006">
-        <mc:Choice xmlns:a14="http://schemas.microsoft.com/office/drawing/2010/main" Requires="a14">
+      <mc:AlternateContent xmlns:mc="http://schemas.openxmlformats.org/markup-compatibility/2006" xmlns:a14="http://schemas.microsoft.com/office/drawing/2010/main">
+        <mc:Choice Requires="a14">
           <p:sp>
             <p:nvSpPr>
               <p:cNvPr id="2" name="Bubble sort">
@@ -8892,7 +9760,7 @@
               </a:ln>
               <a:extLst>
                 <a:ext uri="{C572A759-6A51-4108-AA02-DFA0A04FC94B}">
-                  <ma14:wrappingTextBoxFlag xmlns:ma14="http://schemas.microsoft.com/office/mac/drawingml/2011/main" xmlns:m="http://schemas.openxmlformats.org/officeDocument/2006/math" xmlns="" val="1"/>
+                  <ma14:wrappingTextBoxFlag xmlns="" xmlns:m="http://schemas.openxmlformats.org/officeDocument/2006/math" xmlns:ma14="http://schemas.microsoft.com/office/mac/drawingml/2011/main" val="1"/>
                 </a:ext>
               </a:extLst>
             </p:spPr>
@@ -8996,7 +9864,7 @@
             </p:txBody>
           </p:sp>
         </mc:Choice>
-        <mc:Fallback>
+        <mc:Fallback xmlns="">
           <p:sp>
             <p:nvSpPr>
               <p:cNvPr id="2" name="Bubble sort">
@@ -9049,8 +9917,8 @@
           </p:sp>
         </mc:Fallback>
       </mc:AlternateContent>
-      <mc:AlternateContent xmlns:mc="http://schemas.openxmlformats.org/markup-compatibility/2006">
-        <mc:Choice xmlns:a14="http://schemas.microsoft.com/office/drawing/2010/main" Requires="a14">
+      <mc:AlternateContent xmlns:mc="http://schemas.openxmlformats.org/markup-compatibility/2006" xmlns:a14="http://schemas.microsoft.com/office/drawing/2010/main">
+        <mc:Choice Requires="a14">
           <p:sp>
             <p:nvSpPr>
               <p:cNvPr id="3" name="Bubble sort">
@@ -9076,7 +9944,7 @@
               </a:ln>
               <a:extLst>
                 <a:ext uri="{C572A759-6A51-4108-AA02-DFA0A04FC94B}">
-                  <ma14:wrappingTextBoxFlag xmlns:ma14="http://schemas.microsoft.com/office/mac/drawingml/2011/main" xmlns:m="http://schemas.openxmlformats.org/officeDocument/2006/math" xmlns="" val="1"/>
+                  <ma14:wrappingTextBoxFlag xmlns="" xmlns:m="http://schemas.openxmlformats.org/officeDocument/2006/math" xmlns:ma14="http://schemas.microsoft.com/office/mac/drawingml/2011/main" val="1"/>
                 </a:ext>
               </a:extLst>
             </p:spPr>
@@ -9195,7 +10063,7 @@
             </p:txBody>
           </p:sp>
         </mc:Choice>
-        <mc:Fallback>
+        <mc:Fallback xmlns="">
           <p:sp>
             <p:nvSpPr>
               <p:cNvPr id="3" name="Bubble sort">
@@ -9248,8 +10116,8 @@
           </p:sp>
         </mc:Fallback>
       </mc:AlternateContent>
-      <mc:AlternateContent xmlns:mc="http://schemas.openxmlformats.org/markup-compatibility/2006">
-        <mc:Choice xmlns:a14="http://schemas.microsoft.com/office/drawing/2010/main" Requires="a14">
+      <mc:AlternateContent xmlns:mc="http://schemas.openxmlformats.org/markup-compatibility/2006" xmlns:a14="http://schemas.microsoft.com/office/drawing/2010/main">
+        <mc:Choice Requires="a14">
           <p:sp>
             <p:nvSpPr>
               <p:cNvPr id="4" name="Bubble sort">
@@ -9275,7 +10143,7 @@
               </a:ln>
               <a:extLst>
                 <a:ext uri="{C572A759-6A51-4108-AA02-DFA0A04FC94B}">
-                  <ma14:wrappingTextBoxFlag xmlns:ma14="http://schemas.microsoft.com/office/mac/drawingml/2011/main" xmlns:m="http://schemas.openxmlformats.org/officeDocument/2006/math" xmlns="" val="1"/>
+                  <ma14:wrappingTextBoxFlag xmlns="" xmlns:m="http://schemas.openxmlformats.org/officeDocument/2006/math" xmlns:ma14="http://schemas.microsoft.com/office/mac/drawingml/2011/main" val="1"/>
                 </a:ext>
               </a:extLst>
             </p:spPr>
@@ -9361,7 +10229,7 @@
             </p:txBody>
           </p:sp>
         </mc:Choice>
-        <mc:Fallback>
+        <mc:Fallback xmlns="">
           <p:sp>
             <p:nvSpPr>
               <p:cNvPr id="4" name="Bubble sort">
@@ -9414,8 +10282,8 @@
           </p:sp>
         </mc:Fallback>
       </mc:AlternateContent>
-      <mc:AlternateContent xmlns:mc="http://schemas.openxmlformats.org/markup-compatibility/2006">
-        <mc:Choice xmlns:a14="http://schemas.microsoft.com/office/drawing/2010/main" Requires="a14">
+      <mc:AlternateContent xmlns:mc="http://schemas.openxmlformats.org/markup-compatibility/2006" xmlns:a14="http://schemas.microsoft.com/office/drawing/2010/main">
+        <mc:Choice Requires="a14">
           <p:sp>
             <p:nvSpPr>
               <p:cNvPr id="5" name="Bubble sort">
@@ -9441,7 +10309,7 @@
               </a:ln>
               <a:extLst>
                 <a:ext uri="{C572A759-6A51-4108-AA02-DFA0A04FC94B}">
-                  <ma14:wrappingTextBoxFlag xmlns:ma14="http://schemas.microsoft.com/office/mac/drawingml/2011/main" xmlns:m="http://schemas.openxmlformats.org/officeDocument/2006/math" xmlns="" val="1"/>
+                  <ma14:wrappingTextBoxFlag xmlns="" xmlns:m="http://schemas.openxmlformats.org/officeDocument/2006/math" xmlns:ma14="http://schemas.microsoft.com/office/mac/drawingml/2011/main" val="1"/>
                 </a:ext>
               </a:extLst>
             </p:spPr>
@@ -9494,7 +10362,7 @@
             </p:txBody>
           </p:sp>
         </mc:Choice>
-        <mc:Fallback>
+        <mc:Fallback xmlns="">
           <p:sp>
             <p:nvSpPr>
               <p:cNvPr id="5" name="Bubble sort">
@@ -9547,6 +10415,266 @@
           </p:sp>
         </mc:Fallback>
       </mc:AlternateContent>
+      <p:sp>
+        <p:nvSpPr>
+          <p:cNvPr id="6" name="TextBox 5">
+            <a:extLst>
+              <a:ext uri="{FF2B5EF4-FFF2-40B4-BE49-F238E27FC236}">
+                <a16:creationId xmlns:a16="http://schemas.microsoft.com/office/drawing/2014/main" id="{95A0FCFE-7C6C-BD9E-569D-E0C358345C87}"/>
+              </a:ext>
+            </a:extLst>
+          </p:cNvPr>
+          <p:cNvSpPr txBox="1"/>
+          <p:nvPr/>
+        </p:nvSpPr>
+        <p:spPr>
+          <a:xfrm>
+            <a:off x="11865935" y="4756095"/>
+            <a:ext cx="6592186" cy="1210588"/>
+          </a:xfrm>
+          <a:prstGeom prst="rect">
+            <a:avLst/>
+          </a:prstGeom>
+          <a:noFill/>
+          <a:ln w="12700" cap="flat">
+            <a:noFill/>
+            <a:miter lim="400000"/>
+          </a:ln>
+          <a:effectLst/>
+          <a:sp3d/>
+        </p:spPr>
+        <p:style>
+          <a:lnRef idx="0">
+            <a:scrgbClr r="0" g="0" b="0"/>
+          </a:lnRef>
+          <a:fillRef idx="0">
+            <a:scrgbClr r="0" g="0" b="0"/>
+          </a:fillRef>
+          <a:effectRef idx="0">
+            <a:scrgbClr r="0" g="0" b="0"/>
+          </a:effectRef>
+          <a:fontRef idx="none"/>
+        </p:style>
+        <p:txBody>
+          <a:bodyPr rot="0" spcFirstLastPara="1" vertOverflow="overflow" horzOverflow="overflow" vert="horz" wrap="square" lIns="50800" tIns="50800" rIns="50800" bIns="50800" numCol="1" spcCol="38100" rtlCol="0" anchor="ctr">
+            <a:spAutoFit/>
+          </a:bodyPr>
+          <a:lstStyle/>
+          <a:p>
+            <a:pPr marL="0" marR="0" indent="0" algn="ctr" defTabSz="825500" rtl="0" fontAlgn="auto" latinLnBrk="0" hangingPunct="0">
+              <a:lnSpc>
+                <a:spcPct val="100000"/>
+              </a:lnSpc>
+              <a:spcBef>
+                <a:spcPts val="0"/>
+              </a:spcBef>
+              <a:spcAft>
+                <a:spcPts val="0"/>
+              </a:spcAft>
+              <a:buClrTx/>
+              <a:buSzTx/>
+              <a:buFontTx/>
+              <a:buNone/>
+              <a:tabLst/>
+            </a:pPr>
+            <a:r>
+              <a:rPr kumimoji="0" lang="en-US" sz="7200" b="1" i="0" u="none" strike="noStrike" cap="none" spc="0" normalizeH="0" baseline="0" dirty="0" err="1">
+                <a:ln>
+                  <a:noFill/>
+                </a:ln>
+                <a:solidFill>
+                  <a:srgbClr val="000000"/>
+                </a:solidFill>
+                <a:effectLst/>
+                <a:uFillTx/>
+                <a:latin typeface="Proxima Nova"/>
+                <a:ea typeface="Proxima Nova"/>
+                <a:cs typeface="Proxima Nova"/>
+                <a:sym typeface="Proxima Nova"/>
+              </a:rPr>
+              <a:t>deMorgans</a:t>
+            </a:r>
+            <a:endParaRPr kumimoji="0" lang="en-US" sz="7200" b="1" i="0" u="none" strike="noStrike" cap="none" spc="0" normalizeH="0" baseline="0" dirty="0">
+              <a:ln>
+                <a:noFill/>
+              </a:ln>
+              <a:solidFill>
+                <a:srgbClr val="000000"/>
+              </a:solidFill>
+              <a:effectLst/>
+              <a:uFillTx/>
+              <a:latin typeface="Proxima Nova"/>
+              <a:ea typeface="Proxima Nova"/>
+              <a:cs typeface="Proxima Nova"/>
+              <a:sym typeface="Proxima Nova"/>
+            </a:endParaRPr>
+          </a:p>
+        </p:txBody>
+      </p:sp>
+      <p:sp>
+        <p:nvSpPr>
+          <p:cNvPr id="7" name="TextBox 6">
+            <a:extLst>
+              <a:ext uri="{FF2B5EF4-FFF2-40B4-BE49-F238E27FC236}">
+                <a16:creationId xmlns:a16="http://schemas.microsoft.com/office/drawing/2014/main" id="{6EFDFBF2-F0FC-5B9B-00A1-4A72A2333B42}"/>
+              </a:ext>
+            </a:extLst>
+          </p:cNvPr>
+          <p:cNvSpPr txBox="1"/>
+          <p:nvPr/>
+        </p:nvSpPr>
+        <p:spPr>
+          <a:xfrm>
+            <a:off x="11125200" y="7215156"/>
+            <a:ext cx="6592186" cy="1210588"/>
+          </a:xfrm>
+          <a:prstGeom prst="rect">
+            <a:avLst/>
+          </a:prstGeom>
+          <a:noFill/>
+          <a:ln w="12700" cap="flat">
+            <a:noFill/>
+            <a:miter lim="400000"/>
+          </a:ln>
+          <a:effectLst/>
+          <a:sp3d/>
+        </p:spPr>
+        <p:style>
+          <a:lnRef idx="0">
+            <a:scrgbClr r="0" g="0" b="0"/>
+          </a:lnRef>
+          <a:fillRef idx="0">
+            <a:scrgbClr r="0" g="0" b="0"/>
+          </a:fillRef>
+          <a:effectRef idx="0">
+            <a:scrgbClr r="0" g="0" b="0"/>
+          </a:effectRef>
+          <a:fontRef idx="none"/>
+        </p:style>
+        <p:txBody>
+          <a:bodyPr rot="0" spcFirstLastPara="1" vertOverflow="overflow" horzOverflow="overflow" vert="horz" wrap="square" lIns="50800" tIns="50800" rIns="50800" bIns="50800" numCol="1" spcCol="38100" rtlCol="0" anchor="ctr">
+            <a:spAutoFit/>
+          </a:bodyPr>
+          <a:lstStyle/>
+          <a:p>
+            <a:pPr marL="0" marR="0" indent="0" algn="ctr" defTabSz="825500" rtl="0" fontAlgn="auto" latinLnBrk="0" hangingPunct="0">
+              <a:lnSpc>
+                <a:spcPct val="100000"/>
+              </a:lnSpc>
+              <a:spcBef>
+                <a:spcPts val="0"/>
+              </a:spcBef>
+              <a:spcAft>
+                <a:spcPts val="0"/>
+              </a:spcAft>
+              <a:buClrTx/>
+              <a:buSzTx/>
+              <a:buFontTx/>
+              <a:buNone/>
+              <a:tabLst/>
+            </a:pPr>
+            <a:r>
+              <a:rPr kumimoji="0" lang="en-US" sz="7200" b="1" i="0" u="none" strike="noStrike" cap="none" spc="0" normalizeH="0" baseline="0" dirty="0">
+                <a:ln>
+                  <a:noFill/>
+                </a:ln>
+                <a:solidFill>
+                  <a:srgbClr val="000000"/>
+                </a:solidFill>
+                <a:effectLst/>
+                <a:uFillTx/>
+                <a:latin typeface="Proxima Nova"/>
+                <a:ea typeface="Proxima Nova"/>
+                <a:cs typeface="Proxima Nova"/>
+                <a:sym typeface="Proxima Nova"/>
+              </a:rPr>
+              <a:t>Identity</a:t>
+            </a:r>
+          </a:p>
+        </p:txBody>
+      </p:sp>
+      <p:sp>
+        <p:nvSpPr>
+          <p:cNvPr id="8" name="TextBox 7">
+            <a:extLst>
+              <a:ext uri="{FF2B5EF4-FFF2-40B4-BE49-F238E27FC236}">
+                <a16:creationId xmlns:a16="http://schemas.microsoft.com/office/drawing/2014/main" id="{78815C27-C4D6-CAA2-9A99-26D87314AE50}"/>
+              </a:ext>
+            </a:extLst>
+          </p:cNvPr>
+          <p:cNvSpPr txBox="1"/>
+          <p:nvPr/>
+        </p:nvSpPr>
+        <p:spPr>
+          <a:xfrm>
+            <a:off x="11125200" y="9671147"/>
+            <a:ext cx="6592186" cy="1210588"/>
+          </a:xfrm>
+          <a:prstGeom prst="rect">
+            <a:avLst/>
+          </a:prstGeom>
+          <a:noFill/>
+          <a:ln w="12700" cap="flat">
+            <a:noFill/>
+            <a:miter lim="400000"/>
+          </a:ln>
+          <a:effectLst/>
+          <a:sp3d/>
+        </p:spPr>
+        <p:style>
+          <a:lnRef idx="0">
+            <a:scrgbClr r="0" g="0" b="0"/>
+          </a:lnRef>
+          <a:fillRef idx="0">
+            <a:scrgbClr r="0" g="0" b="0"/>
+          </a:fillRef>
+          <a:effectRef idx="0">
+            <a:scrgbClr r="0" g="0" b="0"/>
+          </a:effectRef>
+          <a:fontRef idx="none"/>
+        </p:style>
+        <p:txBody>
+          <a:bodyPr rot="0" spcFirstLastPara="1" vertOverflow="overflow" horzOverflow="overflow" vert="horz" wrap="square" lIns="50800" tIns="50800" rIns="50800" bIns="50800" numCol="1" spcCol="38100" rtlCol="0" anchor="ctr">
+            <a:spAutoFit/>
+          </a:bodyPr>
+          <a:lstStyle/>
+          <a:p>
+            <a:pPr marL="0" marR="0" indent="0" algn="ctr" defTabSz="825500" rtl="0" fontAlgn="auto" latinLnBrk="0" hangingPunct="0">
+              <a:lnSpc>
+                <a:spcPct val="100000"/>
+              </a:lnSpc>
+              <a:spcBef>
+                <a:spcPts val="0"/>
+              </a:spcBef>
+              <a:spcAft>
+                <a:spcPts val="0"/>
+              </a:spcAft>
+              <a:buClrTx/>
+              <a:buSzTx/>
+              <a:buFontTx/>
+              <a:buNone/>
+              <a:tabLst/>
+            </a:pPr>
+            <a:r>
+              <a:rPr kumimoji="0" lang="en-US" sz="7200" b="1" i="0" u="none" strike="noStrike" cap="none" spc="0" normalizeH="0" baseline="0" dirty="0">
+                <a:ln>
+                  <a:noFill/>
+                </a:ln>
+                <a:solidFill>
+                  <a:srgbClr val="000000"/>
+                </a:solidFill>
+                <a:effectLst/>
+                <a:uFillTx/>
+                <a:latin typeface="Proxima Nova"/>
+                <a:ea typeface="Proxima Nova"/>
+                <a:cs typeface="Proxima Nova"/>
+                <a:sym typeface="Proxima Nova"/>
+              </a:rPr>
+              <a:t>Identity</a:t>
+            </a:r>
+          </a:p>
+        </p:txBody>
+      </p:sp>
     </p:spTree>
     <p:extLst>
       <p:ext uri="{BB962C8B-B14F-4D97-AF65-F5344CB8AC3E}">
@@ -9570,9 +10698,6 @@
                     <p:cTn id="3" fill="hold">
                       <p:stCondLst>
                         <p:cond delay="indefinite"/>
-                        <p:cond evt="onBegin" delay="0">
-                          <p:tn val="2"/>
-                        </p:cond>
                       </p:stCondLst>
                       <p:childTnLst>
                         <p:par>
@@ -9582,7 +10707,7 @@
                             </p:stCondLst>
                             <p:childTnLst>
                               <p:par>
-                                <p:cTn id="5" presetID="1" presetClass="entr" presetSubtype="0" fill="hold" grpId="0" nodeType="withEffect">
+                                <p:cTn id="5" presetID="1" presetClass="entr" presetSubtype="0" fill="hold" grpId="0" nodeType="clickEffect">
                                   <p:stCondLst>
                                     <p:cond delay="0"/>
                                   </p:stCondLst>
@@ -9595,7 +10720,7 @@
                                           </p:stCondLst>
                                         </p:cTn>
                                         <p:tgtEl>
-                                          <p:spTgt spid="2"/>
+                                          <p:spTgt spid="6"/>
                                         </p:tgtEl>
                                         <p:attrNameLst>
                                           <p:attrName>style.visibility</p:attrName>
@@ -9608,15 +10733,33 @@
                                   </p:childTnLst>
                                 </p:cTn>
                               </p:par>
+                            </p:childTnLst>
+                          </p:cTn>
+                        </p:par>
+                      </p:childTnLst>
+                    </p:cTn>
+                  </p:par>
+                  <p:par>
+                    <p:cTn id="7" fill="hold">
+                      <p:stCondLst>
+                        <p:cond delay="indefinite"/>
+                      </p:stCondLst>
+                      <p:childTnLst>
+                        <p:par>
+                          <p:cTn id="8" fill="hold">
+                            <p:stCondLst>
+                              <p:cond delay="0"/>
+                            </p:stCondLst>
+                            <p:childTnLst>
                               <p:par>
-                                <p:cTn id="7" presetID="1" presetClass="entr" presetSubtype="0" fill="hold" grpId="0" nodeType="withEffect">
+                                <p:cTn id="9" presetID="1" presetClass="entr" presetSubtype="0" fill="hold" grpId="0" nodeType="clickEffect">
                                   <p:stCondLst>
                                     <p:cond delay="0"/>
                                   </p:stCondLst>
                                   <p:childTnLst>
                                     <p:set>
                                       <p:cBhvr>
-                                        <p:cTn id="8" dur="1" fill="hold">
+                                        <p:cTn id="10" dur="1" fill="hold">
                                           <p:stCondLst>
                                             <p:cond delay="0"/>
                                           </p:stCondLst>
@@ -9635,15 +10778,78 @@
                                   </p:childTnLst>
                                 </p:cTn>
                               </p:par>
+                            </p:childTnLst>
+                          </p:cTn>
+                        </p:par>
+                      </p:childTnLst>
+                    </p:cTn>
+                  </p:par>
+                  <p:par>
+                    <p:cTn id="11" fill="hold">
+                      <p:stCondLst>
+                        <p:cond delay="indefinite"/>
+                      </p:stCondLst>
+                      <p:childTnLst>
+                        <p:par>
+                          <p:cTn id="12" fill="hold">
+                            <p:stCondLst>
+                              <p:cond delay="0"/>
+                            </p:stCondLst>
+                            <p:childTnLst>
                               <p:par>
-                                <p:cTn id="9" presetID="1" presetClass="entr" presetSubtype="0" fill="hold" grpId="0" nodeType="withEffect">
+                                <p:cTn id="13" presetID="1" presetClass="entr" presetSubtype="0" fill="hold" grpId="0" nodeType="clickEffect">
                                   <p:stCondLst>
                                     <p:cond delay="0"/>
                                   </p:stCondLst>
                                   <p:childTnLst>
                                     <p:set>
                                       <p:cBhvr>
-                                        <p:cTn id="10" dur="1" fill="hold">
+                                        <p:cTn id="14" dur="1" fill="hold">
+                                          <p:stCondLst>
+                                            <p:cond delay="0"/>
+                                          </p:stCondLst>
+                                        </p:cTn>
+                                        <p:tgtEl>
+                                          <p:spTgt spid="7"/>
+                                        </p:tgtEl>
+                                        <p:attrNameLst>
+                                          <p:attrName>style.visibility</p:attrName>
+                                        </p:attrNameLst>
+                                      </p:cBhvr>
+                                      <p:to>
+                                        <p:strVal val="visible"/>
+                                      </p:to>
+                                    </p:set>
+                                  </p:childTnLst>
+                                </p:cTn>
+                              </p:par>
+                            </p:childTnLst>
+                          </p:cTn>
+                        </p:par>
+                      </p:childTnLst>
+                    </p:cTn>
+                  </p:par>
+                  <p:par>
+                    <p:cTn id="15" fill="hold">
+                      <p:stCondLst>
+                        <p:cond delay="indefinite"/>
+                      </p:stCondLst>
+                      <p:childTnLst>
+                        <p:par>
+                          <p:cTn id="16" fill="hold">
+                            <p:stCondLst>
+                              <p:cond delay="0"/>
+                            </p:stCondLst>
+                            <p:childTnLst>
+                              <p:par>
+                                <p:cTn id="17" presetID="1" presetClass="entr" presetSubtype="0" fill="hold" grpId="0" nodeType="clickEffect">
+                                  <p:stCondLst>
+                                    <p:cond delay="0"/>
+                                  </p:stCondLst>
+                                  <p:childTnLst>
+                                    <p:set>
+                                      <p:cBhvr>
+                                        <p:cTn id="18" dur="1" fill="hold">
                                           <p:stCondLst>
                                             <p:cond delay="0"/>
                                           </p:stCondLst>
@@ -9662,15 +10868,78 @@
                                   </p:childTnLst>
                                 </p:cTn>
                               </p:par>
+                            </p:childTnLst>
+                          </p:cTn>
+                        </p:par>
+                      </p:childTnLst>
+                    </p:cTn>
+                  </p:par>
+                  <p:par>
+                    <p:cTn id="19" fill="hold">
+                      <p:stCondLst>
+                        <p:cond delay="indefinite"/>
+                      </p:stCondLst>
+                      <p:childTnLst>
+                        <p:par>
+                          <p:cTn id="20" fill="hold">
+                            <p:stCondLst>
+                              <p:cond delay="0"/>
+                            </p:stCondLst>
+                            <p:childTnLst>
                               <p:par>
-                                <p:cTn id="11" presetID="1" presetClass="entr" presetSubtype="0" fill="hold" grpId="0" nodeType="withEffect">
+                                <p:cTn id="21" presetID="1" presetClass="entr" presetSubtype="0" fill="hold" grpId="0" nodeType="clickEffect">
                                   <p:stCondLst>
                                     <p:cond delay="0"/>
                                   </p:stCondLst>
                                   <p:childTnLst>
                                     <p:set>
                                       <p:cBhvr>
-                                        <p:cTn id="12" dur="1" fill="hold">
+                                        <p:cTn id="22" dur="1" fill="hold">
+                                          <p:stCondLst>
+                                            <p:cond delay="0"/>
+                                          </p:stCondLst>
+                                        </p:cTn>
+                                        <p:tgtEl>
+                                          <p:spTgt spid="8"/>
+                                        </p:tgtEl>
+                                        <p:attrNameLst>
+                                          <p:attrName>style.visibility</p:attrName>
+                                        </p:attrNameLst>
+                                      </p:cBhvr>
+                                      <p:to>
+                                        <p:strVal val="visible"/>
+                                      </p:to>
+                                    </p:set>
+                                  </p:childTnLst>
+                                </p:cTn>
+                              </p:par>
+                            </p:childTnLst>
+                          </p:cTn>
+                        </p:par>
+                      </p:childTnLst>
+                    </p:cTn>
+                  </p:par>
+                  <p:par>
+                    <p:cTn id="23" fill="hold">
+                      <p:stCondLst>
+                        <p:cond delay="indefinite"/>
+                      </p:stCondLst>
+                      <p:childTnLst>
+                        <p:par>
+                          <p:cTn id="24" fill="hold">
+                            <p:stCondLst>
+                              <p:cond delay="0"/>
+                            </p:stCondLst>
+                            <p:childTnLst>
+                              <p:par>
+                                <p:cTn id="25" presetID="1" presetClass="entr" presetSubtype="0" fill="hold" grpId="0" nodeType="clickEffect">
+                                  <p:stCondLst>
+                                    <p:cond delay="0"/>
+                                  </p:stCondLst>
+                                  <p:childTnLst>
+                                    <p:set>
+                                      <p:cBhvr>
+                                        <p:cTn id="26" dur="1" fill="hold">
                                           <p:stCondLst>
                                             <p:cond delay="0"/>
                                           </p:stCondLst>
@@ -9717,16 +10986,18 @@
       </p:par>
     </p:tnLst>
     <p:bldLst>
-      <p:bldP spid="2" grpId="0" animBg="1"/>
       <p:bldP spid="3" grpId="0" animBg="1"/>
       <p:bldP spid="4" grpId="0" animBg="1"/>
       <p:bldP spid="5" grpId="0" animBg="1"/>
+      <p:bldP spid="6" grpId="0"/>
+      <p:bldP spid="7" grpId="0"/>
+      <p:bldP spid="8" grpId="0"/>
     </p:bldLst>
   </p:timing>
 </p:sld>
 </file>
 
-<file path=ppt/slides/slide7.xml><?xml version="1.0" encoding="utf-8"?>
+<file path=ppt/slides/slide8.xml><?xml version="1.0" encoding="utf-8"?>
 <p:sld xmlns:a="http://schemas.openxmlformats.org/drawingml/2006/main" xmlns:r="http://schemas.openxmlformats.org/officeDocument/2006/relationships" xmlns:p="http://schemas.openxmlformats.org/presentationml/2006/main">
   <p:cSld>
     <p:spTree>
@@ -9770,8 +11041,8 @@
           </a:p>
         </p:txBody>
       </p:sp>
-      <mc:AlternateContent xmlns:mc="http://schemas.openxmlformats.org/markup-compatibility/2006">
-        <mc:Choice xmlns:a14="http://schemas.microsoft.com/office/drawing/2010/main" Requires="a14">
+      <mc:AlternateContent xmlns:mc="http://schemas.openxmlformats.org/markup-compatibility/2006" xmlns:a14="http://schemas.microsoft.com/office/drawing/2010/main">
+        <mc:Choice Requires="a14">
           <p:sp>
             <p:nvSpPr>
               <p:cNvPr id="2" name="Bubble sort">
@@ -9797,7 +11068,7 @@
               </a:ln>
               <a:extLst>
                 <a:ext uri="{C572A759-6A51-4108-AA02-DFA0A04FC94B}">
-                  <ma14:wrappingTextBoxFlag xmlns:ma14="http://schemas.microsoft.com/office/mac/drawingml/2011/main" xmlns:m="http://schemas.openxmlformats.org/officeDocument/2006/math" xmlns="" val="1"/>
+                  <ma14:wrappingTextBoxFlag xmlns="" xmlns:m="http://schemas.openxmlformats.org/officeDocument/2006/math" xmlns:ma14="http://schemas.microsoft.com/office/mac/drawingml/2011/main" val="1"/>
                 </a:ext>
               </a:extLst>
             </p:spPr>
@@ -9919,7 +11190,7 @@
             </p:txBody>
           </p:sp>
         </mc:Choice>
-        <mc:Fallback>
+        <mc:Fallback xmlns="">
           <p:sp>
             <p:nvSpPr>
               <p:cNvPr id="2" name="Bubble sort">
@@ -9972,8 +11243,8 @@
           </p:sp>
         </mc:Fallback>
       </mc:AlternateContent>
-      <mc:AlternateContent xmlns:mc="http://schemas.openxmlformats.org/markup-compatibility/2006">
-        <mc:Choice xmlns:a14="http://schemas.microsoft.com/office/drawing/2010/main" Requires="a14">
+      <mc:AlternateContent xmlns:mc="http://schemas.openxmlformats.org/markup-compatibility/2006" xmlns:a14="http://schemas.microsoft.com/office/drawing/2010/main">
+        <mc:Choice Requires="a14">
           <p:sp>
             <p:nvSpPr>
               <p:cNvPr id="3" name="Bubble sort">
@@ -9999,7 +11270,7 @@
               </a:ln>
               <a:extLst>
                 <a:ext uri="{C572A759-6A51-4108-AA02-DFA0A04FC94B}">
-                  <ma14:wrappingTextBoxFlag xmlns:ma14="http://schemas.microsoft.com/office/mac/drawingml/2011/main" xmlns:m="http://schemas.openxmlformats.org/officeDocument/2006/math" xmlns="" val="1"/>
+                  <ma14:wrappingTextBoxFlag xmlns="" xmlns:m="http://schemas.openxmlformats.org/officeDocument/2006/math" xmlns:ma14="http://schemas.microsoft.com/office/mac/drawingml/2011/main" val="1"/>
                 </a:ext>
               </a:extLst>
             </p:spPr>
@@ -10112,7 +11383,7 @@
             </p:txBody>
           </p:sp>
         </mc:Choice>
-        <mc:Fallback>
+        <mc:Fallback xmlns="">
           <p:sp>
             <p:nvSpPr>
               <p:cNvPr id="3" name="Bubble sort">
@@ -10165,8 +11436,8 @@
           </p:sp>
         </mc:Fallback>
       </mc:AlternateContent>
-      <mc:AlternateContent xmlns:mc="http://schemas.openxmlformats.org/markup-compatibility/2006">
-        <mc:Choice xmlns:a14="http://schemas.microsoft.com/office/drawing/2010/main" Requires="a14">
+      <mc:AlternateContent xmlns:mc="http://schemas.openxmlformats.org/markup-compatibility/2006" xmlns:a14="http://schemas.microsoft.com/office/drawing/2010/main">
+        <mc:Choice Requires="a14">
           <p:sp>
             <p:nvSpPr>
               <p:cNvPr id="4" name="Bubble sort">
@@ -10192,7 +11463,7 @@
               </a:ln>
               <a:extLst>
                 <a:ext uri="{C572A759-6A51-4108-AA02-DFA0A04FC94B}">
-                  <ma14:wrappingTextBoxFlag xmlns:ma14="http://schemas.microsoft.com/office/mac/drawingml/2011/main" xmlns:m="http://schemas.openxmlformats.org/officeDocument/2006/math" xmlns="" val="1"/>
+                  <ma14:wrappingTextBoxFlag xmlns="" xmlns:m="http://schemas.openxmlformats.org/officeDocument/2006/math" xmlns:ma14="http://schemas.microsoft.com/office/mac/drawingml/2011/main" val="1"/>
                 </a:ext>
               </a:extLst>
             </p:spPr>
@@ -10263,7 +11534,7 @@
             </p:txBody>
           </p:sp>
         </mc:Choice>
-        <mc:Fallback>
+        <mc:Fallback xmlns="">
           <p:sp>
             <p:nvSpPr>
               <p:cNvPr id="4" name="Bubble sort">
@@ -10316,8 +11587,8 @@
           </p:sp>
         </mc:Fallback>
       </mc:AlternateContent>
-      <mc:AlternateContent xmlns:mc="http://schemas.openxmlformats.org/markup-compatibility/2006">
-        <mc:Choice xmlns:a14="http://schemas.microsoft.com/office/drawing/2010/main" Requires="a14">
+      <mc:AlternateContent xmlns:mc="http://schemas.openxmlformats.org/markup-compatibility/2006" xmlns:a14="http://schemas.microsoft.com/office/drawing/2010/main">
+        <mc:Choice Requires="a14">
           <p:sp>
             <p:nvSpPr>
               <p:cNvPr id="5" name="Bubble sort">
@@ -10343,7 +11614,7 @@
               </a:ln>
               <a:extLst>
                 <a:ext uri="{C572A759-6A51-4108-AA02-DFA0A04FC94B}">
-                  <ma14:wrappingTextBoxFlag xmlns:ma14="http://schemas.microsoft.com/office/mac/drawingml/2011/main" xmlns:m="http://schemas.openxmlformats.org/officeDocument/2006/math" xmlns="" val="1"/>
+                  <ma14:wrappingTextBoxFlag xmlns="" xmlns:m="http://schemas.openxmlformats.org/officeDocument/2006/math" xmlns:ma14="http://schemas.microsoft.com/office/mac/drawingml/2011/main" val="1"/>
                 </a:ext>
               </a:extLst>
             </p:spPr>
@@ -10396,7 +11667,7 @@
             </p:txBody>
           </p:sp>
         </mc:Choice>
-        <mc:Fallback>
+        <mc:Fallback xmlns="">
           <p:sp>
             <p:nvSpPr>
               <p:cNvPr id="5" name="Bubble sort">
@@ -10449,6 +11720,252 @@
           </p:sp>
         </mc:Fallback>
       </mc:AlternateContent>
+      <p:sp>
+        <p:nvSpPr>
+          <p:cNvPr id="6" name="TextBox 5">
+            <a:extLst>
+              <a:ext uri="{FF2B5EF4-FFF2-40B4-BE49-F238E27FC236}">
+                <a16:creationId xmlns:a16="http://schemas.microsoft.com/office/drawing/2014/main" id="{379B1F39-A673-B557-86F3-B6AA228E800D}"/>
+              </a:ext>
+            </a:extLst>
+          </p:cNvPr>
+          <p:cNvSpPr txBox="1"/>
+          <p:nvPr/>
+        </p:nvSpPr>
+        <p:spPr>
+          <a:xfrm>
+            <a:off x="11373362" y="5044750"/>
+            <a:ext cx="6592186" cy="1210588"/>
+          </a:xfrm>
+          <a:prstGeom prst="rect">
+            <a:avLst/>
+          </a:prstGeom>
+          <a:noFill/>
+          <a:ln w="12700" cap="flat">
+            <a:noFill/>
+            <a:miter lim="400000"/>
+          </a:ln>
+          <a:effectLst/>
+          <a:sp3d/>
+        </p:spPr>
+        <p:style>
+          <a:lnRef idx="0">
+            <a:scrgbClr r="0" g="0" b="0"/>
+          </a:lnRef>
+          <a:fillRef idx="0">
+            <a:scrgbClr r="0" g="0" b="0"/>
+          </a:fillRef>
+          <a:effectRef idx="0">
+            <a:scrgbClr r="0" g="0" b="0"/>
+          </a:effectRef>
+          <a:fontRef idx="none"/>
+        </p:style>
+        <p:txBody>
+          <a:bodyPr rot="0" spcFirstLastPara="1" vertOverflow="overflow" horzOverflow="overflow" vert="horz" wrap="square" lIns="50800" tIns="50800" rIns="50800" bIns="50800" numCol="1" spcCol="38100" rtlCol="0" anchor="ctr">
+            <a:spAutoFit/>
+          </a:bodyPr>
+          <a:lstStyle/>
+          <a:p>
+            <a:pPr marL="0" marR="0" indent="0" algn="ctr" defTabSz="825500" rtl="0" fontAlgn="auto" latinLnBrk="0" hangingPunct="0">
+              <a:lnSpc>
+                <a:spcPct val="100000"/>
+              </a:lnSpc>
+              <a:spcBef>
+                <a:spcPts val="0"/>
+              </a:spcBef>
+              <a:spcAft>
+                <a:spcPts val="0"/>
+              </a:spcAft>
+              <a:buClrTx/>
+              <a:buSzTx/>
+              <a:buFontTx/>
+              <a:buNone/>
+              <a:tabLst/>
+            </a:pPr>
+            <a:r>
+              <a:rPr kumimoji="0" lang="en-US" sz="7200" b="1" i="0" u="none" strike="noStrike" cap="none" spc="0" normalizeH="0" baseline="0" dirty="0">
+                <a:ln>
+                  <a:noFill/>
+                </a:ln>
+                <a:solidFill>
+                  <a:srgbClr val="000000"/>
+                </a:solidFill>
+                <a:effectLst/>
+                <a:uFillTx/>
+                <a:latin typeface="Proxima Nova"/>
+                <a:ea typeface="Proxima Nova"/>
+                <a:cs typeface="Proxima Nova"/>
+                <a:sym typeface="Proxima Nova"/>
+              </a:rPr>
+              <a:t>Distributivity</a:t>
+            </a:r>
+          </a:p>
+        </p:txBody>
+      </p:sp>
+      <p:sp>
+        <p:nvSpPr>
+          <p:cNvPr id="7" name="TextBox 6">
+            <a:extLst>
+              <a:ext uri="{FF2B5EF4-FFF2-40B4-BE49-F238E27FC236}">
+                <a16:creationId xmlns:a16="http://schemas.microsoft.com/office/drawing/2014/main" id="{F6397025-777D-B62C-A44B-64E6B281E4E5}"/>
+              </a:ext>
+            </a:extLst>
+          </p:cNvPr>
+          <p:cNvSpPr txBox="1"/>
+          <p:nvPr/>
+        </p:nvSpPr>
+        <p:spPr>
+          <a:xfrm>
+            <a:off x="11125200" y="7215156"/>
+            <a:ext cx="6592186" cy="1210588"/>
+          </a:xfrm>
+          <a:prstGeom prst="rect">
+            <a:avLst/>
+          </a:prstGeom>
+          <a:noFill/>
+          <a:ln w="12700" cap="flat">
+            <a:noFill/>
+            <a:miter lim="400000"/>
+          </a:ln>
+          <a:effectLst/>
+          <a:sp3d/>
+        </p:spPr>
+        <p:style>
+          <a:lnRef idx="0">
+            <a:scrgbClr r="0" g="0" b="0"/>
+          </a:lnRef>
+          <a:fillRef idx="0">
+            <a:scrgbClr r="0" g="0" b="0"/>
+          </a:fillRef>
+          <a:effectRef idx="0">
+            <a:scrgbClr r="0" g="0" b="0"/>
+          </a:effectRef>
+          <a:fontRef idx="none"/>
+        </p:style>
+        <p:txBody>
+          <a:bodyPr rot="0" spcFirstLastPara="1" vertOverflow="overflow" horzOverflow="overflow" vert="horz" wrap="square" lIns="50800" tIns="50800" rIns="50800" bIns="50800" numCol="1" spcCol="38100" rtlCol="0" anchor="ctr">
+            <a:spAutoFit/>
+          </a:bodyPr>
+          <a:lstStyle/>
+          <a:p>
+            <a:pPr marL="0" marR="0" indent="0" algn="ctr" defTabSz="825500" rtl="0" fontAlgn="auto" latinLnBrk="0" hangingPunct="0">
+              <a:lnSpc>
+                <a:spcPct val="100000"/>
+              </a:lnSpc>
+              <a:spcBef>
+                <a:spcPts val="0"/>
+              </a:spcBef>
+              <a:spcAft>
+                <a:spcPts val="0"/>
+              </a:spcAft>
+              <a:buClrTx/>
+              <a:buSzTx/>
+              <a:buFontTx/>
+              <a:buNone/>
+              <a:tabLst/>
+            </a:pPr>
+            <a:r>
+              <a:rPr kumimoji="0" lang="en-US" sz="7200" b="1" i="0" u="none" strike="noStrike" cap="none" spc="0" normalizeH="0" baseline="0" dirty="0">
+                <a:ln>
+                  <a:noFill/>
+                </a:ln>
+                <a:solidFill>
+                  <a:srgbClr val="000000"/>
+                </a:solidFill>
+                <a:effectLst/>
+                <a:uFillTx/>
+                <a:latin typeface="Proxima Nova"/>
+                <a:ea typeface="Proxima Nova"/>
+                <a:cs typeface="Proxima Nova"/>
+                <a:sym typeface="Proxima Nova"/>
+              </a:rPr>
+              <a:t>Identity</a:t>
+            </a:r>
+          </a:p>
+        </p:txBody>
+      </p:sp>
+      <p:sp>
+        <p:nvSpPr>
+          <p:cNvPr id="8" name="TextBox 7">
+            <a:extLst>
+              <a:ext uri="{FF2B5EF4-FFF2-40B4-BE49-F238E27FC236}">
+                <a16:creationId xmlns:a16="http://schemas.microsoft.com/office/drawing/2014/main" id="{26D7AFB9-615F-6E0D-1458-529ABF87C4EA}"/>
+              </a:ext>
+            </a:extLst>
+          </p:cNvPr>
+          <p:cNvSpPr txBox="1"/>
+          <p:nvPr/>
+        </p:nvSpPr>
+        <p:spPr>
+          <a:xfrm>
+            <a:off x="11125200" y="9671147"/>
+            <a:ext cx="6592186" cy="1210588"/>
+          </a:xfrm>
+          <a:prstGeom prst="rect">
+            <a:avLst/>
+          </a:prstGeom>
+          <a:noFill/>
+          <a:ln w="12700" cap="flat">
+            <a:noFill/>
+            <a:miter lim="400000"/>
+          </a:ln>
+          <a:effectLst/>
+          <a:sp3d/>
+        </p:spPr>
+        <p:style>
+          <a:lnRef idx="0">
+            <a:scrgbClr r="0" g="0" b="0"/>
+          </a:lnRef>
+          <a:fillRef idx="0">
+            <a:scrgbClr r="0" g="0" b="0"/>
+          </a:fillRef>
+          <a:effectRef idx="0">
+            <a:scrgbClr r="0" g="0" b="0"/>
+          </a:effectRef>
+          <a:fontRef idx="none"/>
+        </p:style>
+        <p:txBody>
+          <a:bodyPr rot="0" spcFirstLastPara="1" vertOverflow="overflow" horzOverflow="overflow" vert="horz" wrap="square" lIns="50800" tIns="50800" rIns="50800" bIns="50800" numCol="1" spcCol="38100" rtlCol="0" anchor="ctr">
+            <a:spAutoFit/>
+          </a:bodyPr>
+          <a:lstStyle/>
+          <a:p>
+            <a:pPr marL="0" marR="0" indent="0" algn="ctr" defTabSz="825500" rtl="0" fontAlgn="auto" latinLnBrk="0" hangingPunct="0">
+              <a:lnSpc>
+                <a:spcPct val="100000"/>
+              </a:lnSpc>
+              <a:spcBef>
+                <a:spcPts val="0"/>
+              </a:spcBef>
+              <a:spcAft>
+                <a:spcPts val="0"/>
+              </a:spcAft>
+              <a:buClrTx/>
+              <a:buSzTx/>
+              <a:buFontTx/>
+              <a:buNone/>
+              <a:tabLst/>
+            </a:pPr>
+            <a:r>
+              <a:rPr kumimoji="0" lang="en-US" sz="7200" b="1" i="0" u="none" strike="noStrike" cap="none" spc="0" normalizeH="0" baseline="0" dirty="0">
+                <a:ln>
+                  <a:noFill/>
+                </a:ln>
+                <a:solidFill>
+                  <a:srgbClr val="000000"/>
+                </a:solidFill>
+                <a:effectLst/>
+                <a:uFillTx/>
+                <a:latin typeface="Proxima Nova"/>
+                <a:ea typeface="Proxima Nova"/>
+                <a:cs typeface="Proxima Nova"/>
+                <a:sym typeface="Proxima Nova"/>
+              </a:rPr>
+              <a:t>Identity</a:t>
+            </a:r>
+          </a:p>
+        </p:txBody>
+      </p:sp>
     </p:spTree>
     <p:extLst>
       <p:ext uri="{BB962C8B-B14F-4D97-AF65-F5344CB8AC3E}">
@@ -10510,15 +12027,78 @@
                                   </p:childTnLst>
                                 </p:cTn>
                               </p:par>
+                            </p:childTnLst>
+                          </p:cTn>
+                        </p:par>
+                      </p:childTnLst>
+                    </p:cTn>
+                  </p:par>
+                  <p:par>
+                    <p:cTn id="7" fill="hold">
+                      <p:stCondLst>
+                        <p:cond delay="indefinite"/>
+                      </p:stCondLst>
+                      <p:childTnLst>
+                        <p:par>
+                          <p:cTn id="8" fill="hold">
+                            <p:stCondLst>
+                              <p:cond delay="0"/>
+                            </p:stCondLst>
+                            <p:childTnLst>
                               <p:par>
-                                <p:cTn id="7" presetID="1" presetClass="entr" presetSubtype="0" fill="hold" grpId="0" nodeType="withEffect">
+                                <p:cTn id="9" presetID="1" presetClass="entr" presetSubtype="0" fill="hold" grpId="0" nodeType="clickEffect">
                                   <p:stCondLst>
                                     <p:cond delay="0"/>
                                   </p:stCondLst>
                                   <p:childTnLst>
                                     <p:set>
                                       <p:cBhvr>
-                                        <p:cTn id="8" dur="1" fill="hold">
+                                        <p:cTn id="10" dur="1" fill="hold">
+                                          <p:stCondLst>
+                                            <p:cond delay="0"/>
+                                          </p:stCondLst>
+                                        </p:cTn>
+                                        <p:tgtEl>
+                                          <p:spTgt spid="6"/>
+                                        </p:tgtEl>
+                                        <p:attrNameLst>
+                                          <p:attrName>style.visibility</p:attrName>
+                                        </p:attrNameLst>
+                                      </p:cBhvr>
+                                      <p:to>
+                                        <p:strVal val="visible"/>
+                                      </p:to>
+                                    </p:set>
+                                  </p:childTnLst>
+                                </p:cTn>
+                              </p:par>
+                            </p:childTnLst>
+                          </p:cTn>
+                        </p:par>
+                      </p:childTnLst>
+                    </p:cTn>
+                  </p:par>
+                  <p:par>
+                    <p:cTn id="11" fill="hold">
+                      <p:stCondLst>
+                        <p:cond delay="indefinite"/>
+                      </p:stCondLst>
+                      <p:childTnLst>
+                        <p:par>
+                          <p:cTn id="12" fill="hold">
+                            <p:stCondLst>
+                              <p:cond delay="0"/>
+                            </p:stCondLst>
+                            <p:childTnLst>
+                              <p:par>
+                                <p:cTn id="13" presetID="1" presetClass="entr" presetSubtype="0" fill="hold" grpId="0" nodeType="clickEffect">
+                                  <p:stCondLst>
+                                    <p:cond delay="0"/>
+                                  </p:stCondLst>
+                                  <p:childTnLst>
+                                    <p:set>
+                                      <p:cBhvr>
+                                        <p:cTn id="14" dur="1" fill="hold">
                                           <p:stCondLst>
                                             <p:cond delay="0"/>
                                           </p:stCondLst>
@@ -10537,15 +12117,78 @@
                                   </p:childTnLst>
                                 </p:cTn>
                               </p:par>
+                            </p:childTnLst>
+                          </p:cTn>
+                        </p:par>
+                      </p:childTnLst>
+                    </p:cTn>
+                  </p:par>
+                  <p:par>
+                    <p:cTn id="15" fill="hold">
+                      <p:stCondLst>
+                        <p:cond delay="indefinite"/>
+                      </p:stCondLst>
+                      <p:childTnLst>
+                        <p:par>
+                          <p:cTn id="16" fill="hold">
+                            <p:stCondLst>
+                              <p:cond delay="0"/>
+                            </p:stCondLst>
+                            <p:childTnLst>
                               <p:par>
-                                <p:cTn id="9" presetID="1" presetClass="entr" presetSubtype="0" fill="hold" grpId="0" nodeType="withEffect">
+                                <p:cTn id="17" presetID="1" presetClass="entr" presetSubtype="0" fill="hold" grpId="0" nodeType="clickEffect">
                                   <p:stCondLst>
                                     <p:cond delay="0"/>
                                   </p:stCondLst>
                                   <p:childTnLst>
                                     <p:set>
                                       <p:cBhvr>
-                                        <p:cTn id="10" dur="1" fill="hold">
+                                        <p:cTn id="18" dur="1" fill="hold">
+                                          <p:stCondLst>
+                                            <p:cond delay="0"/>
+                                          </p:stCondLst>
+                                        </p:cTn>
+                                        <p:tgtEl>
+                                          <p:spTgt spid="7"/>
+                                        </p:tgtEl>
+                                        <p:attrNameLst>
+                                          <p:attrName>style.visibility</p:attrName>
+                                        </p:attrNameLst>
+                                      </p:cBhvr>
+                                      <p:to>
+                                        <p:strVal val="visible"/>
+                                      </p:to>
+                                    </p:set>
+                                  </p:childTnLst>
+                                </p:cTn>
+                              </p:par>
+                            </p:childTnLst>
+                          </p:cTn>
+                        </p:par>
+                      </p:childTnLst>
+                    </p:cTn>
+                  </p:par>
+                  <p:par>
+                    <p:cTn id="19" fill="hold">
+                      <p:stCondLst>
+                        <p:cond delay="indefinite"/>
+                      </p:stCondLst>
+                      <p:childTnLst>
+                        <p:par>
+                          <p:cTn id="20" fill="hold">
+                            <p:stCondLst>
+                              <p:cond delay="0"/>
+                            </p:stCondLst>
+                            <p:childTnLst>
+                              <p:par>
+                                <p:cTn id="21" presetID="1" presetClass="entr" presetSubtype="0" fill="hold" grpId="0" nodeType="clickEffect">
+                                  <p:stCondLst>
+                                    <p:cond delay="0"/>
+                                  </p:stCondLst>
+                                  <p:childTnLst>
+                                    <p:set>
+                                      <p:cBhvr>
+                                        <p:cTn id="22" dur="1" fill="hold">
                                           <p:stCondLst>
                                             <p:cond delay="0"/>
                                           </p:stCondLst>
@@ -10564,15 +12207,78 @@
                                   </p:childTnLst>
                                 </p:cTn>
                               </p:par>
+                            </p:childTnLst>
+                          </p:cTn>
+                        </p:par>
+                      </p:childTnLst>
+                    </p:cTn>
+                  </p:par>
+                  <p:par>
+                    <p:cTn id="23" fill="hold">
+                      <p:stCondLst>
+                        <p:cond delay="indefinite"/>
+                      </p:stCondLst>
+                      <p:childTnLst>
+                        <p:par>
+                          <p:cTn id="24" fill="hold">
+                            <p:stCondLst>
+                              <p:cond delay="0"/>
+                            </p:stCondLst>
+                            <p:childTnLst>
                               <p:par>
-                                <p:cTn id="11" presetID="1" presetClass="entr" presetSubtype="0" fill="hold" grpId="0" nodeType="withEffect">
+                                <p:cTn id="25" presetID="1" presetClass="entr" presetSubtype="0" fill="hold" grpId="0" nodeType="clickEffect">
                                   <p:stCondLst>
                                     <p:cond delay="0"/>
                                   </p:stCondLst>
                                   <p:childTnLst>
                                     <p:set>
                                       <p:cBhvr>
-                                        <p:cTn id="12" dur="1" fill="hold">
+                                        <p:cTn id="26" dur="1" fill="hold">
+                                          <p:stCondLst>
+                                            <p:cond delay="0"/>
+                                          </p:stCondLst>
+                                        </p:cTn>
+                                        <p:tgtEl>
+                                          <p:spTgt spid="8"/>
+                                        </p:tgtEl>
+                                        <p:attrNameLst>
+                                          <p:attrName>style.visibility</p:attrName>
+                                        </p:attrNameLst>
+                                      </p:cBhvr>
+                                      <p:to>
+                                        <p:strVal val="visible"/>
+                                      </p:to>
+                                    </p:set>
+                                  </p:childTnLst>
+                                </p:cTn>
+                              </p:par>
+                            </p:childTnLst>
+                          </p:cTn>
+                        </p:par>
+                      </p:childTnLst>
+                    </p:cTn>
+                  </p:par>
+                  <p:par>
+                    <p:cTn id="27" fill="hold">
+                      <p:stCondLst>
+                        <p:cond delay="indefinite"/>
+                      </p:stCondLst>
+                      <p:childTnLst>
+                        <p:par>
+                          <p:cTn id="28" fill="hold">
+                            <p:stCondLst>
+                              <p:cond delay="0"/>
+                            </p:stCondLst>
+                            <p:childTnLst>
+                              <p:par>
+                                <p:cTn id="29" presetID="1" presetClass="entr" presetSubtype="0" fill="hold" grpId="0" nodeType="clickEffect">
+                                  <p:stCondLst>
+                                    <p:cond delay="0"/>
+                                  </p:stCondLst>
+                                  <p:childTnLst>
+                                    <p:set>
+                                      <p:cBhvr>
+                                        <p:cTn id="30" dur="1" fill="hold">
                                           <p:stCondLst>
                                             <p:cond delay="0"/>
                                           </p:stCondLst>
@@ -10623,6 +12329,221 @@
       <p:bldP spid="3" grpId="0" animBg="1"/>
       <p:bldP spid="4" grpId="0" animBg="1"/>
       <p:bldP spid="5" grpId="0" animBg="1"/>
+      <p:bldP spid="6" grpId="0"/>
+      <p:bldP spid="7" grpId="0"/>
+      <p:bldP spid="8" grpId="0"/>
+    </p:bldLst>
+  </p:timing>
+</p:sld>
+</file>
+
+<file path=ppt/slides/slide9.xml><?xml version="1.0" encoding="utf-8"?>
+<p:sld xmlns:a="http://schemas.openxmlformats.org/drawingml/2006/main" xmlns:r="http://schemas.openxmlformats.org/officeDocument/2006/relationships" xmlns:p="http://schemas.openxmlformats.org/presentationml/2006/main">
+  <p:cSld>
+    <p:spTree>
+      <p:nvGrpSpPr>
+        <p:cNvPr id="1" name=""/>
+        <p:cNvGrpSpPr/>
+        <p:nvPr/>
+      </p:nvGrpSpPr>
+      <p:grpSpPr>
+        <a:xfrm>
+          <a:off x="0" y="0"/>
+          <a:ext cx="0" cy="0"/>
+          <a:chOff x="0" y="0"/>
+          <a:chExt cx="0" cy="0"/>
+        </a:xfrm>
+      </p:grpSpPr>
+      <p:sp>
+        <p:nvSpPr>
+          <p:cNvPr id="3" name="TextBox 2">
+            <a:extLst>
+              <a:ext uri="{FF2B5EF4-FFF2-40B4-BE49-F238E27FC236}">
+                <a16:creationId xmlns:a16="http://schemas.microsoft.com/office/drawing/2014/main" id="{F527A2E1-F637-D7B4-CA77-0D333F17E0FF}"/>
+              </a:ext>
+            </a:extLst>
+          </p:cNvPr>
+          <p:cNvSpPr txBox="1"/>
+          <p:nvPr/>
+        </p:nvSpPr>
+        <p:spPr>
+          <a:xfrm>
+            <a:off x="11125200" y="9671147"/>
+            <a:ext cx="6592186" cy="1210588"/>
+          </a:xfrm>
+          <a:prstGeom prst="rect">
+            <a:avLst/>
+          </a:prstGeom>
+          <a:noFill/>
+          <a:ln w="12700" cap="flat">
+            <a:noFill/>
+            <a:miter lim="400000"/>
+          </a:ln>
+          <a:effectLst/>
+          <a:sp3d/>
+        </p:spPr>
+        <p:style>
+          <a:lnRef idx="0">
+            <a:scrgbClr r="0" g="0" b="0"/>
+          </a:lnRef>
+          <a:fillRef idx="0">
+            <a:scrgbClr r="0" g="0" b="0"/>
+          </a:fillRef>
+          <a:effectRef idx="0">
+            <a:scrgbClr r="0" g="0" b="0"/>
+          </a:effectRef>
+          <a:fontRef idx="none"/>
+        </p:style>
+        <p:txBody>
+          <a:bodyPr rot="0" spcFirstLastPara="1" vertOverflow="overflow" horzOverflow="overflow" vert="horz" wrap="square" lIns="50800" tIns="50800" rIns="50800" bIns="50800" numCol="1" spcCol="38100" rtlCol="0" anchor="ctr">
+            <a:spAutoFit/>
+          </a:bodyPr>
+          <a:lstStyle/>
+          <a:p>
+            <a:pPr marL="0" marR="0" indent="0" algn="ctr" defTabSz="825500" rtl="0" fontAlgn="auto" latinLnBrk="0" hangingPunct="0">
+              <a:lnSpc>
+                <a:spcPct val="100000"/>
+              </a:lnSpc>
+              <a:spcBef>
+                <a:spcPts val="0"/>
+              </a:spcBef>
+              <a:spcAft>
+                <a:spcPts val="0"/>
+              </a:spcAft>
+              <a:buClrTx/>
+              <a:buSzTx/>
+              <a:buFontTx/>
+              <a:buNone/>
+              <a:tabLst/>
+            </a:pPr>
+            <a:r>
+              <a:rPr lang="en-US" sz="7200" b="1" dirty="0" err="1"/>
+              <a:t>t</a:t>
+            </a:r>
+            <a:r>
+              <a:rPr kumimoji="0" lang="en-US" sz="7200" b="1" i="0" u="none" strike="noStrike" cap="none" spc="0" normalizeH="0" baseline="0" dirty="0" err="1">
+                <a:ln>
+                  <a:noFill/>
+                </a:ln>
+                <a:solidFill>
+                  <a:srgbClr val="000000"/>
+                </a:solidFill>
+                <a:effectLst/>
+                <a:uFillTx/>
+                <a:latin typeface="Proxima Nova"/>
+                <a:ea typeface="Proxima Nova"/>
+                <a:cs typeface="Proxima Nova"/>
+                <a:sym typeface="Proxima Nova"/>
+              </a:rPr>
+              <a:t>inyurl.com</a:t>
+            </a:r>
+            <a:r>
+              <a:rPr kumimoji="0" lang="en-US" sz="7200" b="1" i="0" u="none" strike="noStrike" cap="none" spc="0" normalizeH="0" baseline="0" dirty="0">
+                <a:ln>
+                  <a:noFill/>
+                </a:ln>
+                <a:solidFill>
+                  <a:srgbClr val="000000"/>
+                </a:solidFill>
+                <a:effectLst/>
+                <a:uFillTx/>
+                <a:latin typeface="Proxima Nova"/>
+                <a:ea typeface="Proxima Nova"/>
+                <a:cs typeface="Proxima Nova"/>
+                <a:sym typeface="Proxima Nova"/>
+              </a:rPr>
+              <a:t>/</a:t>
+            </a:r>
+          </a:p>
+        </p:txBody>
+      </p:sp>
+    </p:spTree>
+    <p:extLst>
+      <p:ext uri="{BB962C8B-B14F-4D97-AF65-F5344CB8AC3E}">
+        <p14:creationId xmlns:p14="http://schemas.microsoft.com/office/powerpoint/2010/main" val="1910034192"/>
+      </p:ext>
+    </p:extLst>
+  </p:cSld>
+  <p:clrMapOvr>
+    <a:masterClrMapping/>
+  </p:clrMapOvr>
+  <p:transition spd="med"/>
+  <p:timing>
+    <p:tnLst>
+      <p:par>
+        <p:cTn id="1" dur="indefinite" restart="never" nodeType="tmRoot">
+          <p:childTnLst>
+            <p:seq concurrent="1" nextAc="seek">
+              <p:cTn id="2" dur="indefinite" nodeType="mainSeq">
+                <p:childTnLst>
+                  <p:par>
+                    <p:cTn id="3" fill="hold">
+                      <p:stCondLst>
+                        <p:cond delay="indefinite"/>
+                      </p:stCondLst>
+                      <p:childTnLst>
+                        <p:par>
+                          <p:cTn id="4" fill="hold">
+                            <p:stCondLst>
+                              <p:cond delay="0"/>
+                            </p:stCondLst>
+                            <p:childTnLst>
+                              <p:par>
+                                <p:cTn id="5" presetID="1" presetClass="entr" presetSubtype="0" fill="hold" grpId="0" nodeType="clickEffect">
+                                  <p:stCondLst>
+                                    <p:cond delay="0"/>
+                                  </p:stCondLst>
+                                  <p:childTnLst>
+                                    <p:set>
+                                      <p:cBhvr>
+                                        <p:cTn id="6" dur="1" fill="hold">
+                                          <p:stCondLst>
+                                            <p:cond delay="0"/>
+                                          </p:stCondLst>
+                                        </p:cTn>
+                                        <p:tgtEl>
+                                          <p:spTgt spid="3"/>
+                                        </p:tgtEl>
+                                        <p:attrNameLst>
+                                          <p:attrName>style.visibility</p:attrName>
+                                        </p:attrNameLst>
+                                      </p:cBhvr>
+                                      <p:to>
+                                        <p:strVal val="visible"/>
+                                      </p:to>
+                                    </p:set>
+                                  </p:childTnLst>
+                                </p:cTn>
+                              </p:par>
+                            </p:childTnLst>
+                          </p:cTn>
+                        </p:par>
+                      </p:childTnLst>
+                    </p:cTn>
+                  </p:par>
+                </p:childTnLst>
+              </p:cTn>
+              <p:prevCondLst>
+                <p:cond evt="onPrev" delay="0">
+                  <p:tgtEl>
+                    <p:sldTgt/>
+                  </p:tgtEl>
+                </p:cond>
+              </p:prevCondLst>
+              <p:nextCondLst>
+                <p:cond evt="onNext" delay="0">
+                  <p:tgtEl>
+                    <p:sldTgt/>
+                  </p:tgtEl>
+                </p:cond>
+              </p:nextCondLst>
+            </p:seq>
+          </p:childTnLst>
+        </p:cTn>
+      </p:par>
+    </p:tnLst>
+    <p:bldLst>
+      <p:bldP spid="3" grpId="0"/>
     </p:bldLst>
   </p:timing>
 </p:sld>

</xml_diff>